<commit_message>
Add files via upload
</commit_message>
<xml_diff>
--- a/網站說明.pptx
+++ b/網站說明.pptx
@@ -6,11 +6,18 @@
   </p:sldMasterIdLst>
   <p:sldIdLst>
     <p:sldId id="256" r:id="rId2"/>
-    <p:sldId id="257" r:id="rId3"/>
-    <p:sldId id="258" r:id="rId4"/>
-    <p:sldId id="260" r:id="rId5"/>
-    <p:sldId id="262" r:id="rId6"/>
-    <p:sldId id="261" r:id="rId7"/>
+    <p:sldId id="263" r:id="rId3"/>
+    <p:sldId id="257" r:id="rId4"/>
+    <p:sldId id="268" r:id="rId5"/>
+    <p:sldId id="267" r:id="rId6"/>
+    <p:sldId id="269" r:id="rId7"/>
+    <p:sldId id="264" r:id="rId8"/>
+    <p:sldId id="265" r:id="rId9"/>
+    <p:sldId id="266" r:id="rId10"/>
+    <p:sldId id="258" r:id="rId11"/>
+    <p:sldId id="260" r:id="rId12"/>
+    <p:sldId id="262" r:id="rId13"/>
+    <p:sldId id="261" r:id="rId14"/>
   </p:sldIdLst>
   <p:sldSz cx="12192000" cy="6858000"/>
   <p:notesSz cx="6858000" cy="9144000"/>
@@ -448,7 +455,7 @@
           <a:p>
             <a:fld id="{11D1B1DC-5AFC-4C66-A141-9DE8E264B910}" type="datetimeFigureOut">
               <a:rPr lang="zh-TW" altLang="en-US" smtClean="0"/>
-              <a:t>2022/1/18</a:t>
+              <a:t>2022/1/25</a:t>
             </a:fld>
             <a:endParaRPr lang="zh-TW" altLang="en-US"/>
           </a:p>
@@ -772,7 +779,7 @@
           <a:p>
             <a:fld id="{11D1B1DC-5AFC-4C66-A141-9DE8E264B910}" type="datetimeFigureOut">
               <a:rPr lang="zh-TW" altLang="en-US" smtClean="0"/>
-              <a:t>2022/1/18</a:t>
+              <a:t>2022/1/25</a:t>
             </a:fld>
             <a:endParaRPr lang="zh-TW" altLang="en-US"/>
           </a:p>
@@ -1020,7 +1027,7 @@
           <a:p>
             <a:fld id="{11D1B1DC-5AFC-4C66-A141-9DE8E264B910}" type="datetimeFigureOut">
               <a:rPr lang="zh-TW" altLang="en-US" smtClean="0"/>
-              <a:t>2022/1/18</a:t>
+              <a:t>2022/1/25</a:t>
             </a:fld>
             <a:endParaRPr lang="zh-TW" altLang="en-US"/>
           </a:p>
@@ -1359,7 +1366,7 @@
           <a:p>
             <a:fld id="{11D1B1DC-5AFC-4C66-A141-9DE8E264B910}" type="datetimeFigureOut">
               <a:rPr lang="zh-TW" altLang="en-US" smtClean="0"/>
-              <a:t>2022/1/18</a:t>
+              <a:t>2022/1/25</a:t>
             </a:fld>
             <a:endParaRPr lang="zh-TW" altLang="en-US"/>
           </a:p>
@@ -1706,7 +1713,7 @@
           <a:p>
             <a:fld id="{11D1B1DC-5AFC-4C66-A141-9DE8E264B910}" type="datetimeFigureOut">
               <a:rPr lang="zh-TW" altLang="en-US" smtClean="0"/>
-              <a:t>2022/1/18</a:t>
+              <a:t>2022/1/25</a:t>
             </a:fld>
             <a:endParaRPr lang="zh-TW" altLang="en-US"/>
           </a:p>
@@ -2080,7 +2087,7 @@
           <a:p>
             <a:fld id="{11D1B1DC-5AFC-4C66-A141-9DE8E264B910}" type="datetimeFigureOut">
               <a:rPr lang="zh-TW" altLang="en-US" smtClean="0"/>
-              <a:t>2022/1/18</a:t>
+              <a:t>2022/1/25</a:t>
             </a:fld>
             <a:endParaRPr lang="zh-TW" altLang="en-US"/>
           </a:p>
@@ -2550,7 +2557,7 @@
           <a:p>
             <a:fld id="{11D1B1DC-5AFC-4C66-A141-9DE8E264B910}" type="datetimeFigureOut">
               <a:rPr lang="zh-TW" altLang="en-US" smtClean="0"/>
-              <a:t>2022/1/18</a:t>
+              <a:t>2022/1/25</a:t>
             </a:fld>
             <a:endParaRPr lang="zh-TW" altLang="en-US"/>
           </a:p>
@@ -2755,7 +2762,7 @@
           <a:p>
             <a:fld id="{11D1B1DC-5AFC-4C66-A141-9DE8E264B910}" type="datetimeFigureOut">
               <a:rPr lang="zh-TW" altLang="en-US" smtClean="0"/>
-              <a:t>2022/1/18</a:t>
+              <a:t>2022/1/25</a:t>
             </a:fld>
             <a:endParaRPr lang="zh-TW" altLang="en-US"/>
           </a:p>
@@ -2966,7 +2973,7 @@
           <a:p>
             <a:fld id="{11D1B1DC-5AFC-4C66-A141-9DE8E264B910}" type="datetimeFigureOut">
               <a:rPr lang="zh-TW" altLang="en-US" smtClean="0"/>
-              <a:t>2022/1/18</a:t>
+              <a:t>2022/1/25</a:t>
             </a:fld>
             <a:endParaRPr lang="zh-TW" altLang="en-US"/>
           </a:p>
@@ -3198,7 +3205,7 @@
           <a:p>
             <a:fld id="{11D1B1DC-5AFC-4C66-A141-9DE8E264B910}" type="datetimeFigureOut">
               <a:rPr lang="zh-TW" altLang="en-US" smtClean="0"/>
-              <a:t>2022/1/18</a:t>
+              <a:t>2022/1/25</a:t>
             </a:fld>
             <a:endParaRPr lang="zh-TW" altLang="en-US"/>
           </a:p>
@@ -3446,7 +3453,7 @@
           <a:p>
             <a:fld id="{11D1B1DC-5AFC-4C66-A141-9DE8E264B910}" type="datetimeFigureOut">
               <a:rPr lang="zh-TW" altLang="en-US" smtClean="0"/>
-              <a:t>2022/1/18</a:t>
+              <a:t>2022/1/25</a:t>
             </a:fld>
             <a:endParaRPr lang="zh-TW" altLang="en-US"/>
           </a:p>
@@ -3744,7 +3751,7 @@
           <a:p>
             <a:fld id="{11D1B1DC-5AFC-4C66-A141-9DE8E264B910}" type="datetimeFigureOut">
               <a:rPr lang="zh-TW" altLang="en-US" smtClean="0"/>
-              <a:t>2022/1/18</a:t>
+              <a:t>2022/1/25</a:t>
             </a:fld>
             <a:endParaRPr lang="zh-TW" altLang="en-US"/>
           </a:p>
@@ -4138,7 +4145,7 @@
           <a:p>
             <a:fld id="{11D1B1DC-5AFC-4C66-A141-9DE8E264B910}" type="datetimeFigureOut">
               <a:rPr lang="zh-TW" altLang="en-US" smtClean="0"/>
-              <a:t>2022/1/18</a:t>
+              <a:t>2022/1/25</a:t>
             </a:fld>
             <a:endParaRPr lang="zh-TW" altLang="en-US"/>
           </a:p>
@@ -4287,7 +4294,7 @@
           <a:p>
             <a:fld id="{11D1B1DC-5AFC-4C66-A141-9DE8E264B910}" type="datetimeFigureOut">
               <a:rPr lang="zh-TW" altLang="en-US" smtClean="0"/>
-              <a:t>2022/1/18</a:t>
+              <a:t>2022/1/25</a:t>
             </a:fld>
             <a:endParaRPr lang="zh-TW" altLang="en-US"/>
           </a:p>
@@ -4413,7 +4420,7 @@
           <a:p>
             <a:fld id="{11D1B1DC-5AFC-4C66-A141-9DE8E264B910}" type="datetimeFigureOut">
               <a:rPr lang="zh-TW" altLang="en-US" smtClean="0"/>
-              <a:t>2022/1/18</a:t>
+              <a:t>2022/1/25</a:t>
             </a:fld>
             <a:endParaRPr lang="zh-TW" altLang="en-US"/>
           </a:p>
@@ -4668,7 +4675,7 @@
           <a:p>
             <a:fld id="{11D1B1DC-5AFC-4C66-A141-9DE8E264B910}" type="datetimeFigureOut">
               <a:rPr lang="zh-TW" altLang="en-US" smtClean="0"/>
-              <a:t>2022/1/18</a:t>
+              <a:t>2022/1/25</a:t>
             </a:fld>
             <a:endParaRPr lang="zh-TW" altLang="en-US"/>
           </a:p>
@@ -4983,7 +4990,7 @@
           <a:p>
             <a:fld id="{11D1B1DC-5AFC-4C66-A141-9DE8E264B910}" type="datetimeFigureOut">
               <a:rPr lang="zh-TW" altLang="en-US" smtClean="0"/>
-              <a:t>2022/1/18</a:t>
+              <a:t>2022/1/25</a:t>
             </a:fld>
             <a:endParaRPr lang="zh-TW" altLang="en-US"/>
           </a:p>
@@ -5334,7 +5341,7 @@
           <a:p>
             <a:fld id="{11D1B1DC-5AFC-4C66-A141-9DE8E264B910}" type="datetimeFigureOut">
               <a:rPr lang="zh-TW" altLang="en-US" smtClean="0"/>
-              <a:t>2022/1/18</a:t>
+              <a:t>2022/1/25</a:t>
             </a:fld>
             <a:endParaRPr lang="zh-TW" altLang="en-US"/>
           </a:p>
@@ -6009,6 +6016,828 @@
 </p:sld>
 </file>
 
+<file path=ppt/slides/slide10.xml><?xml version="1.0" encoding="utf-8"?>
+<p:sld xmlns:a="http://schemas.openxmlformats.org/drawingml/2006/main" xmlns:r="http://schemas.openxmlformats.org/officeDocument/2006/relationships" xmlns:p="http://schemas.openxmlformats.org/presentationml/2006/main">
+  <p:cSld>
+    <p:spTree>
+      <p:nvGrpSpPr>
+        <p:cNvPr id="1" name=""/>
+        <p:cNvGrpSpPr/>
+        <p:nvPr/>
+      </p:nvGrpSpPr>
+      <p:grpSpPr>
+        <a:xfrm>
+          <a:off x="0" y="0"/>
+          <a:ext cx="0" cy="0"/>
+          <a:chOff x="0" y="0"/>
+          <a:chExt cx="0" cy="0"/>
+        </a:xfrm>
+      </p:grpSpPr>
+      <p:sp>
+        <p:nvSpPr>
+          <p:cNvPr id="2" name="標題 1">
+            <a:extLst>
+              <a:ext uri="{FF2B5EF4-FFF2-40B4-BE49-F238E27FC236}">
+                <a16:creationId xmlns:a16="http://schemas.microsoft.com/office/drawing/2014/main" id="{2369A219-1F70-457D-9E89-1EE29F1DF1FC}"/>
+              </a:ext>
+            </a:extLst>
+          </p:cNvPr>
+          <p:cNvSpPr>
+            <a:spLocks noGrp="1"/>
+          </p:cNvSpPr>
+          <p:nvPr>
+            <p:ph type="title"/>
+          </p:nvPr>
+        </p:nvSpPr>
+        <p:spPr/>
+        <p:txBody>
+          <a:bodyPr/>
+          <a:lstStyle/>
+          <a:p>
+            <a:r>
+              <a:rPr lang="zh-TW" altLang="en-US" dirty="0">
+                <a:latin typeface="標楷體" panose="03000509000000000000" pitchFamily="65" charset="-120"/>
+                <a:ea typeface="標楷體" panose="03000509000000000000" pitchFamily="65" charset="-120"/>
+              </a:rPr>
+              <a:t>網站特色</a:t>
+            </a:r>
+          </a:p>
+        </p:txBody>
+      </p:sp>
+      <p:sp>
+        <p:nvSpPr>
+          <p:cNvPr id="3" name="內容版面配置區 2">
+            <a:extLst>
+              <a:ext uri="{FF2B5EF4-FFF2-40B4-BE49-F238E27FC236}">
+                <a16:creationId xmlns:a16="http://schemas.microsoft.com/office/drawing/2014/main" id="{5F4EF5D5-96A3-44FB-B188-D9A4A61F6016}"/>
+              </a:ext>
+            </a:extLst>
+          </p:cNvPr>
+          <p:cNvSpPr>
+            <a:spLocks noGrp="1"/>
+          </p:cNvSpPr>
+          <p:nvPr>
+            <p:ph idx="1"/>
+          </p:nvPr>
+        </p:nvSpPr>
+        <p:spPr/>
+        <p:txBody>
+          <a:bodyPr>
+            <a:normAutofit fontScale="77500" lnSpcReduction="20000"/>
+          </a:bodyPr>
+          <a:lstStyle/>
+          <a:p>
+            <a:r>
+              <a:rPr lang="zh-TW" altLang="en-US" dirty="0">
+                <a:latin typeface="標楷體" panose="03000509000000000000" pitchFamily="65" charset="-120"/>
+                <a:ea typeface="標楷體" panose="03000509000000000000" pitchFamily="65" charset="-120"/>
+              </a:rPr>
+              <a:t>結合登入登出、</a:t>
+            </a:r>
+            <a:r>
+              <a:rPr lang="en-US" altLang="zh-TW" dirty="0">
+                <a:latin typeface="Times New Roman" panose="02020603050405020304" pitchFamily="18" charset="0"/>
+                <a:ea typeface="標楷體" panose="03000509000000000000" pitchFamily="65" charset="-120"/>
+                <a:cs typeface="Times New Roman" panose="02020603050405020304" pitchFamily="18" charset="0"/>
+              </a:rPr>
+              <a:t>Google Sheet</a:t>
+            </a:r>
+            <a:r>
+              <a:rPr lang="zh-TW" altLang="en-US" dirty="0">
+                <a:latin typeface="Times New Roman" panose="02020603050405020304" pitchFamily="18" charset="0"/>
+                <a:ea typeface="標楷體" panose="03000509000000000000" pitchFamily="65" charset="-120"/>
+                <a:cs typeface="Times New Roman" panose="02020603050405020304" pitchFamily="18" charset="0"/>
+              </a:rPr>
+              <a:t>、</a:t>
+            </a:r>
+            <a:r>
+              <a:rPr lang="en-US" altLang="zh-TW" dirty="0" err="1">
+                <a:latin typeface="Times New Roman" panose="02020603050405020304" pitchFamily="18" charset="0"/>
+                <a:ea typeface="標楷體" panose="03000509000000000000" pitchFamily="65" charset="-120"/>
+                <a:cs typeface="Times New Roman" panose="02020603050405020304" pitchFamily="18" charset="0"/>
+              </a:rPr>
+              <a:t>Localstorage</a:t>
+            </a:r>
+            <a:r>
+              <a:rPr lang="zh-TW" altLang="en-US" dirty="0">
+                <a:latin typeface="Times New Roman" panose="02020603050405020304" pitchFamily="18" charset="0"/>
+                <a:ea typeface="標楷體" panose="03000509000000000000" pitchFamily="65" charset="-120"/>
+                <a:cs typeface="Times New Roman" panose="02020603050405020304" pitchFamily="18" charset="0"/>
+              </a:rPr>
+              <a:t>相關操作</a:t>
+            </a:r>
+            <a:r>
+              <a:rPr lang="zh-TW" altLang="en-US" dirty="0">
+                <a:latin typeface="標楷體" panose="03000509000000000000" pitchFamily="65" charset="-120"/>
+                <a:ea typeface="標楷體" panose="03000509000000000000" pitchFamily="65" charset="-120"/>
+              </a:rPr>
+              <a:t>，方便使用者紀錄自己的情況又不必擔心資料外洩。</a:t>
+            </a:r>
+            <a:endParaRPr lang="en-US" altLang="zh-TW" dirty="0">
+              <a:latin typeface="標楷體" panose="03000509000000000000" pitchFamily="65" charset="-120"/>
+              <a:ea typeface="標楷體" panose="03000509000000000000" pitchFamily="65" charset="-120"/>
+            </a:endParaRPr>
+          </a:p>
+          <a:p>
+            <a:r>
+              <a:rPr lang="zh-TW" altLang="en-US" dirty="0">
+                <a:latin typeface="標楷體" panose="03000509000000000000" pitchFamily="65" charset="-120"/>
+                <a:ea typeface="標楷體" panose="03000509000000000000" pitchFamily="65" charset="-120"/>
+              </a:rPr>
+              <a:t>以 </a:t>
+            </a:r>
+            <a:r>
+              <a:rPr lang="en-US" altLang="zh-TW" dirty="0">
+                <a:latin typeface="Times New Roman" panose="02020603050405020304" pitchFamily="18" charset="0"/>
+                <a:ea typeface="標楷體" panose="03000509000000000000" pitchFamily="65" charset="-120"/>
+                <a:cs typeface="Times New Roman" panose="02020603050405020304" pitchFamily="18" charset="0"/>
+              </a:rPr>
+              <a:t>Google Sheet</a:t>
+            </a:r>
+            <a:r>
+              <a:rPr lang="zh-TW" altLang="en-US" dirty="0">
+                <a:latin typeface="Times New Roman" panose="02020603050405020304" pitchFamily="18" charset="0"/>
+                <a:ea typeface="標楷體" panose="03000509000000000000" pitchFamily="65" charset="-120"/>
+                <a:cs typeface="Times New Roman" panose="02020603050405020304" pitchFamily="18" charset="0"/>
+              </a:rPr>
+              <a:t> 實現六大功能。</a:t>
+            </a:r>
+            <a:endParaRPr lang="en-US" altLang="zh-TW" dirty="0">
+              <a:latin typeface="Times New Roman" panose="02020603050405020304" pitchFamily="18" charset="0"/>
+              <a:ea typeface="標楷體" panose="03000509000000000000" pitchFamily="65" charset="-120"/>
+              <a:cs typeface="Times New Roman" panose="02020603050405020304" pitchFamily="18" charset="0"/>
+            </a:endParaRPr>
+          </a:p>
+          <a:p>
+            <a:r>
+              <a:rPr lang="zh-TW" altLang="en-US" dirty="0">
+                <a:latin typeface="標楷體" panose="03000509000000000000" pitchFamily="65" charset="-120"/>
+                <a:ea typeface="標楷體" panose="03000509000000000000" pitchFamily="65" charset="-120"/>
+              </a:rPr>
+              <a:t>排版簡單清楚且美觀、一目了然。</a:t>
+            </a:r>
+            <a:endParaRPr lang="en-US" altLang="zh-TW" dirty="0">
+              <a:latin typeface="Times New Roman" panose="02020603050405020304" pitchFamily="18" charset="0"/>
+              <a:ea typeface="標楷體" panose="03000509000000000000" pitchFamily="65" charset="-120"/>
+              <a:cs typeface="Times New Roman" panose="02020603050405020304" pitchFamily="18" charset="0"/>
+            </a:endParaRPr>
+          </a:p>
+          <a:p>
+            <a:r>
+              <a:rPr lang="zh-TW" altLang="en-US" dirty="0">
+                <a:latin typeface="標楷體" panose="03000509000000000000" pitchFamily="65" charset="-120"/>
+                <a:ea typeface="標楷體" panose="03000509000000000000" pitchFamily="65" charset="-120"/>
+              </a:rPr>
+              <a:t>與部分手機</a:t>
+            </a:r>
+            <a:r>
+              <a:rPr lang="en-US" altLang="zh-TW" dirty="0">
+                <a:latin typeface="Times New Roman" panose="02020603050405020304" pitchFamily="18" charset="0"/>
+                <a:ea typeface="標楷體" panose="03000509000000000000" pitchFamily="65" charset="-120"/>
+                <a:cs typeface="Times New Roman" panose="02020603050405020304" pitchFamily="18" charset="0"/>
+              </a:rPr>
+              <a:t>app</a:t>
+            </a:r>
+            <a:r>
+              <a:rPr lang="zh-TW" altLang="en-US" dirty="0">
+                <a:latin typeface="標楷體" panose="03000509000000000000" pitchFamily="65" charset="-120"/>
+                <a:ea typeface="標楷體" panose="03000509000000000000" pitchFamily="65" charset="-120"/>
+              </a:rPr>
+              <a:t>比起來，不必多花費儲存空間下載或觀看廣告且多了其他應用。</a:t>
+            </a:r>
+            <a:endParaRPr lang="en-US" altLang="zh-TW" dirty="0">
+              <a:latin typeface="標楷體" panose="03000509000000000000" pitchFamily="65" charset="-120"/>
+              <a:ea typeface="標楷體" panose="03000509000000000000" pitchFamily="65" charset="-120"/>
+            </a:endParaRPr>
+          </a:p>
+          <a:p>
+            <a:r>
+              <a:rPr lang="zh-TW" altLang="en-US" dirty="0">
+                <a:latin typeface="標楷體" panose="03000509000000000000" pitchFamily="65" charset="-120"/>
+                <a:ea typeface="標楷體" panose="03000509000000000000" pitchFamily="65" charset="-120"/>
+              </a:rPr>
+              <a:t>三種紀錄功能提供圖表且依時間由近到遠排序，資料更加視覺化且方便查閱。</a:t>
+            </a:r>
+            <a:endParaRPr lang="en-US" altLang="zh-TW" dirty="0">
+              <a:latin typeface="標楷體" panose="03000509000000000000" pitchFamily="65" charset="-120"/>
+              <a:ea typeface="標楷體" panose="03000509000000000000" pitchFamily="65" charset="-120"/>
+            </a:endParaRPr>
+          </a:p>
+          <a:p>
+            <a:r>
+              <a:rPr lang="zh-TW" altLang="en-US" dirty="0">
+                <a:latin typeface="標楷體" panose="03000509000000000000" pitchFamily="65" charset="-120"/>
+                <a:ea typeface="標楷體" panose="03000509000000000000" pitchFamily="65" charset="-120"/>
+              </a:rPr>
+              <a:t>連接至外部網站，補充相關飲食知識。</a:t>
+            </a:r>
+            <a:endParaRPr lang="en-US" altLang="zh-TW" dirty="0">
+              <a:latin typeface="標楷體" panose="03000509000000000000" pitchFamily="65" charset="-120"/>
+              <a:ea typeface="標楷體" panose="03000509000000000000" pitchFamily="65" charset="-120"/>
+            </a:endParaRPr>
+          </a:p>
+          <a:p>
+            <a:r>
+              <a:rPr lang="zh-TW" altLang="en-US" dirty="0">
+                <a:latin typeface="標楷體" panose="03000509000000000000" pitchFamily="65" charset="-120"/>
+                <a:ea typeface="標楷體" panose="03000509000000000000" pitchFamily="65" charset="-120"/>
+              </a:rPr>
+              <a:t>對於主要功能有快速導覽，增加便利性。</a:t>
+            </a:r>
+            <a:endParaRPr lang="en-US" altLang="zh-TW" dirty="0">
+              <a:latin typeface="標楷體" panose="03000509000000000000" pitchFamily="65" charset="-120"/>
+              <a:ea typeface="標楷體" panose="03000509000000000000" pitchFamily="65" charset="-120"/>
+            </a:endParaRPr>
+          </a:p>
+          <a:p>
+            <a:r>
+              <a:rPr lang="zh-TW" altLang="en-US" dirty="0">
+                <a:latin typeface="標楷體" panose="03000509000000000000" pitchFamily="65" charset="-120"/>
+                <a:ea typeface="標楷體" panose="03000509000000000000" pitchFamily="65" charset="-120"/>
+              </a:rPr>
+              <a:t>附有</a:t>
+            </a:r>
+            <a:r>
+              <a:rPr lang="en-US" altLang="zh-TW" dirty="0">
+                <a:latin typeface="標楷體" panose="03000509000000000000" pitchFamily="65" charset="-120"/>
+                <a:ea typeface="標楷體" panose="03000509000000000000" pitchFamily="65" charset="-120"/>
+              </a:rPr>
+              <a:t>FB</a:t>
+            </a:r>
+            <a:r>
+              <a:rPr lang="zh-TW" altLang="en-US" dirty="0">
+                <a:latin typeface="標楷體" panose="03000509000000000000" pitchFamily="65" charset="-120"/>
+                <a:ea typeface="標楷體" panose="03000509000000000000" pitchFamily="65" charset="-120"/>
+              </a:rPr>
+              <a:t>健身社團連結等更多資訊。</a:t>
+            </a:r>
+            <a:endParaRPr lang="en-US" altLang="zh-TW" dirty="0">
+              <a:latin typeface="標楷體" panose="03000509000000000000" pitchFamily="65" charset="-120"/>
+              <a:ea typeface="標楷體" panose="03000509000000000000" pitchFamily="65" charset="-120"/>
+            </a:endParaRPr>
+          </a:p>
+          <a:p>
+            <a:endParaRPr lang="zh-TW" altLang="en-US" dirty="0"/>
+          </a:p>
+        </p:txBody>
+      </p:sp>
+    </p:spTree>
+    <p:extLst>
+      <p:ext uri="{BB962C8B-B14F-4D97-AF65-F5344CB8AC3E}">
+        <p14:creationId xmlns:p14="http://schemas.microsoft.com/office/powerpoint/2010/main" val="2339830431"/>
+      </p:ext>
+    </p:extLst>
+  </p:cSld>
+  <p:clrMapOvr>
+    <a:masterClrMapping/>
+  </p:clrMapOvr>
+</p:sld>
+</file>
+
+<file path=ppt/slides/slide11.xml><?xml version="1.0" encoding="utf-8"?>
+<p:sld xmlns:a="http://schemas.openxmlformats.org/drawingml/2006/main" xmlns:r="http://schemas.openxmlformats.org/officeDocument/2006/relationships" xmlns:p="http://schemas.openxmlformats.org/presentationml/2006/main">
+  <p:cSld>
+    <p:spTree>
+      <p:nvGrpSpPr>
+        <p:cNvPr id="1" name=""/>
+        <p:cNvGrpSpPr/>
+        <p:nvPr/>
+      </p:nvGrpSpPr>
+      <p:grpSpPr>
+        <a:xfrm>
+          <a:off x="0" y="0"/>
+          <a:ext cx="0" cy="0"/>
+          <a:chOff x="0" y="0"/>
+          <a:chExt cx="0" cy="0"/>
+        </a:xfrm>
+      </p:grpSpPr>
+      <p:sp>
+        <p:nvSpPr>
+          <p:cNvPr id="2" name="標題 1">
+            <a:extLst>
+              <a:ext uri="{FF2B5EF4-FFF2-40B4-BE49-F238E27FC236}">
+                <a16:creationId xmlns:a16="http://schemas.microsoft.com/office/drawing/2014/main" id="{9D8BD1AA-3DF1-40EE-9254-D06FEB68956C}"/>
+              </a:ext>
+            </a:extLst>
+          </p:cNvPr>
+          <p:cNvSpPr>
+            <a:spLocks noGrp="1"/>
+          </p:cNvSpPr>
+          <p:nvPr>
+            <p:ph type="title"/>
+          </p:nvPr>
+        </p:nvSpPr>
+        <p:spPr/>
+        <p:txBody>
+          <a:bodyPr/>
+          <a:lstStyle/>
+          <a:p>
+            <a:r>
+              <a:rPr lang="zh-TW" altLang="en-US" dirty="0">
+                <a:latin typeface="標楷體" panose="03000509000000000000" pitchFamily="65" charset="-120"/>
+                <a:ea typeface="標楷體" panose="03000509000000000000" pitchFamily="65" charset="-120"/>
+              </a:rPr>
+              <a:t>使用技術</a:t>
+            </a:r>
+          </a:p>
+        </p:txBody>
+      </p:sp>
+      <p:sp>
+        <p:nvSpPr>
+          <p:cNvPr id="3" name="內容版面配置區 2">
+            <a:extLst>
+              <a:ext uri="{FF2B5EF4-FFF2-40B4-BE49-F238E27FC236}">
+                <a16:creationId xmlns:a16="http://schemas.microsoft.com/office/drawing/2014/main" id="{DC77F753-E23F-483D-82B2-E718DBD00F8A}"/>
+              </a:ext>
+            </a:extLst>
+          </p:cNvPr>
+          <p:cNvSpPr>
+            <a:spLocks noGrp="1"/>
+          </p:cNvSpPr>
+          <p:nvPr>
+            <p:ph idx="1"/>
+          </p:nvPr>
+        </p:nvSpPr>
+        <p:spPr>
+          <a:xfrm>
+            <a:off x="1295401" y="2556932"/>
+            <a:ext cx="9601196" cy="3691468"/>
+          </a:xfrm>
+        </p:spPr>
+        <p:txBody>
+          <a:bodyPr/>
+          <a:lstStyle/>
+          <a:p>
+            <a:r>
+              <a:rPr lang="en-US" altLang="zh-TW" dirty="0">
+                <a:latin typeface="Times New Roman" panose="02020603050405020304" pitchFamily="18" charset="0"/>
+                <a:cs typeface="Times New Roman" panose="02020603050405020304" pitchFamily="18" charset="0"/>
+              </a:rPr>
+              <a:t>HTML</a:t>
+            </a:r>
+          </a:p>
+          <a:p>
+            <a:r>
+              <a:rPr lang="en-US" altLang="zh-TW" dirty="0">
+                <a:latin typeface="Times New Roman" panose="02020603050405020304" pitchFamily="18" charset="0"/>
+                <a:cs typeface="Times New Roman" panose="02020603050405020304" pitchFamily="18" charset="0"/>
+              </a:rPr>
+              <a:t>CSS</a:t>
+            </a:r>
+            <a:r>
+              <a:rPr lang="zh-TW" altLang="en-US" dirty="0">
+                <a:latin typeface="Times New Roman" panose="02020603050405020304" pitchFamily="18" charset="0"/>
+                <a:cs typeface="Times New Roman" panose="02020603050405020304" pitchFamily="18" charset="0"/>
+              </a:rPr>
+              <a:t>、</a:t>
+            </a:r>
+            <a:r>
+              <a:rPr lang="en-US" altLang="zh-TW" dirty="0">
+                <a:latin typeface="Times New Roman" panose="02020603050405020304" pitchFamily="18" charset="0"/>
+                <a:cs typeface="Times New Roman" panose="02020603050405020304" pitchFamily="18" charset="0"/>
+              </a:rPr>
+              <a:t>RWD</a:t>
+            </a:r>
+          </a:p>
+          <a:p>
+            <a:r>
+              <a:rPr lang="en-US" altLang="zh-TW" dirty="0">
+                <a:latin typeface="Times New Roman" panose="02020603050405020304" pitchFamily="18" charset="0"/>
+                <a:cs typeface="Times New Roman" panose="02020603050405020304" pitchFamily="18" charset="0"/>
+              </a:rPr>
+              <a:t>Bootstrap</a:t>
+            </a:r>
+          </a:p>
+          <a:p>
+            <a:r>
+              <a:rPr lang="en-US" altLang="zh-TW" dirty="0">
+                <a:latin typeface="Times New Roman" panose="02020603050405020304" pitchFamily="18" charset="0"/>
+                <a:cs typeface="Times New Roman" panose="02020603050405020304" pitchFamily="18" charset="0"/>
+              </a:rPr>
+              <a:t>JavaScript</a:t>
+            </a:r>
+          </a:p>
+          <a:p>
+            <a:r>
+              <a:rPr lang="en-US" altLang="zh-TW" dirty="0">
+                <a:latin typeface="Times New Roman" panose="02020603050405020304" pitchFamily="18" charset="0"/>
+                <a:cs typeface="Times New Roman" panose="02020603050405020304" pitchFamily="18" charset="0"/>
+              </a:rPr>
+              <a:t>Google Sheet</a:t>
+            </a:r>
+            <a:r>
+              <a:rPr lang="zh-TW" altLang="en-US" dirty="0">
+                <a:latin typeface="Times New Roman" panose="02020603050405020304" pitchFamily="18" charset="0"/>
+                <a:cs typeface="Times New Roman" panose="02020603050405020304" pitchFamily="18" charset="0"/>
+              </a:rPr>
+              <a:t>、</a:t>
+            </a:r>
+            <a:r>
+              <a:rPr lang="en-US" altLang="zh-TW" dirty="0">
+                <a:latin typeface="Times New Roman" panose="02020603050405020304" pitchFamily="18" charset="0"/>
+                <a:cs typeface="Times New Roman" panose="02020603050405020304" pitchFamily="18" charset="0"/>
+              </a:rPr>
+              <a:t>Google Chart</a:t>
+            </a:r>
+            <a:r>
+              <a:rPr lang="zh-TW" altLang="en-US" dirty="0">
+                <a:latin typeface="Times New Roman" panose="02020603050405020304" pitchFamily="18" charset="0"/>
+                <a:cs typeface="Times New Roman" panose="02020603050405020304" pitchFamily="18" charset="0"/>
+              </a:rPr>
+              <a:t>、</a:t>
+            </a:r>
+            <a:r>
+              <a:rPr lang="en-US" altLang="zh-TW" dirty="0">
+                <a:latin typeface="Times New Roman" panose="02020603050405020304" pitchFamily="18" charset="0"/>
+                <a:cs typeface="Times New Roman" panose="02020603050405020304" pitchFamily="18" charset="0"/>
+              </a:rPr>
+              <a:t>Ajax(ex</a:t>
+            </a:r>
+            <a:r>
+              <a:rPr lang="en-US" altLang="zh-TW" dirty="0"/>
+              <a:t>.</a:t>
+            </a:r>
+            <a:r>
+              <a:rPr lang="zh-TW" altLang="en-US" dirty="0"/>
+              <a:t> </a:t>
+            </a:r>
+            <a:r>
+              <a:rPr lang="zh-TW" altLang="en-US" dirty="0">
+                <a:latin typeface="標楷體" panose="03000509000000000000" pitchFamily="65" charset="-120"/>
+                <a:ea typeface="標楷體" panose="03000509000000000000" pitchFamily="65" charset="-120"/>
+              </a:rPr>
+              <a:t>熱量紀錄圓餅圖</a:t>
+            </a:r>
+            <a:r>
+              <a:rPr lang="en-US" altLang="zh-TW" dirty="0">
+                <a:latin typeface="標楷體" panose="03000509000000000000" pitchFamily="65" charset="-120"/>
+                <a:ea typeface="標楷體" panose="03000509000000000000" pitchFamily="65" charset="-120"/>
+              </a:rPr>
+              <a:t>)</a:t>
+            </a:r>
+          </a:p>
+          <a:p>
+            <a:r>
+              <a:rPr lang="en-US" altLang="zh-TW" dirty="0" err="1">
+                <a:latin typeface="Times New Roman" panose="02020603050405020304" pitchFamily="18" charset="0"/>
+                <a:cs typeface="Times New Roman" panose="02020603050405020304" pitchFamily="18" charset="0"/>
+              </a:rPr>
+              <a:t>FaceBook</a:t>
+            </a:r>
+            <a:r>
+              <a:rPr lang="en-US" altLang="zh-TW" dirty="0">
+                <a:latin typeface="Times New Roman" panose="02020603050405020304" pitchFamily="18" charset="0"/>
+                <a:cs typeface="Times New Roman" panose="02020603050405020304" pitchFamily="18" charset="0"/>
+              </a:rPr>
+              <a:t>(ex</a:t>
+            </a:r>
+            <a:r>
+              <a:rPr lang="en-US" altLang="zh-TW" dirty="0"/>
+              <a:t>. </a:t>
+            </a:r>
+            <a:r>
+              <a:rPr lang="zh-TW" altLang="en-US" dirty="0">
+                <a:latin typeface="標楷體" panose="03000509000000000000" pitchFamily="65" charset="-120"/>
+                <a:ea typeface="標楷體" panose="03000509000000000000" pitchFamily="65" charset="-120"/>
+              </a:rPr>
+              <a:t>推薦的健身、減重社團</a:t>
+            </a:r>
+            <a:r>
+              <a:rPr lang="en-US" altLang="zh-TW" dirty="0">
+                <a:latin typeface="標楷體" panose="03000509000000000000" pitchFamily="65" charset="-120"/>
+                <a:ea typeface="標楷體" panose="03000509000000000000" pitchFamily="65" charset="-120"/>
+              </a:rPr>
+              <a:t>)</a:t>
+            </a:r>
+          </a:p>
+          <a:p>
+            <a:r>
+              <a:rPr lang="en-US" altLang="zh-TW" dirty="0" err="1">
+                <a:latin typeface="Times New Roman" panose="02020603050405020304" pitchFamily="18" charset="0"/>
+                <a:ea typeface="標楷體" panose="03000509000000000000" pitchFamily="65" charset="-120"/>
+                <a:cs typeface="Times New Roman" panose="02020603050405020304" pitchFamily="18" charset="0"/>
+              </a:rPr>
+              <a:t>Instergram</a:t>
+            </a:r>
+            <a:r>
+              <a:rPr lang="en-US" altLang="zh-TW" dirty="0">
+                <a:latin typeface="Times New Roman" panose="02020603050405020304" pitchFamily="18" charset="0"/>
+                <a:ea typeface="標楷體" panose="03000509000000000000" pitchFamily="65" charset="-120"/>
+                <a:cs typeface="Times New Roman" panose="02020603050405020304" pitchFamily="18" charset="0"/>
+              </a:rPr>
+              <a:t>(#hashtag)</a:t>
+            </a:r>
+            <a:endParaRPr lang="zh-TW" altLang="en-US" dirty="0">
+              <a:latin typeface="Times New Roman" panose="02020603050405020304" pitchFamily="18" charset="0"/>
+              <a:cs typeface="Times New Roman" panose="02020603050405020304" pitchFamily="18" charset="0"/>
+            </a:endParaRPr>
+          </a:p>
+        </p:txBody>
+      </p:sp>
+    </p:spTree>
+    <p:extLst>
+      <p:ext uri="{BB962C8B-B14F-4D97-AF65-F5344CB8AC3E}">
+        <p14:creationId xmlns:p14="http://schemas.microsoft.com/office/powerpoint/2010/main" val="495122803"/>
+      </p:ext>
+    </p:extLst>
+  </p:cSld>
+  <p:clrMapOvr>
+    <a:masterClrMapping/>
+  </p:clrMapOvr>
+</p:sld>
+</file>
+
+<file path=ppt/slides/slide12.xml><?xml version="1.0" encoding="utf-8"?>
+<p:sld xmlns:a="http://schemas.openxmlformats.org/drawingml/2006/main" xmlns:r="http://schemas.openxmlformats.org/officeDocument/2006/relationships" xmlns:p="http://schemas.openxmlformats.org/presentationml/2006/main">
+  <p:cSld>
+    <p:spTree>
+      <p:nvGrpSpPr>
+        <p:cNvPr id="1" name=""/>
+        <p:cNvGrpSpPr/>
+        <p:nvPr/>
+      </p:nvGrpSpPr>
+      <p:grpSpPr>
+        <a:xfrm>
+          <a:off x="0" y="0"/>
+          <a:ext cx="0" cy="0"/>
+          <a:chOff x="0" y="0"/>
+          <a:chExt cx="0" cy="0"/>
+        </a:xfrm>
+      </p:grpSpPr>
+      <p:sp>
+        <p:nvSpPr>
+          <p:cNvPr id="2" name="標題 1">
+            <a:extLst>
+              <a:ext uri="{FF2B5EF4-FFF2-40B4-BE49-F238E27FC236}">
+                <a16:creationId xmlns:a16="http://schemas.microsoft.com/office/drawing/2014/main" id="{BF366DC7-F8D9-452D-8F7F-FC1E2F2E3F94}"/>
+              </a:ext>
+            </a:extLst>
+          </p:cNvPr>
+          <p:cNvSpPr>
+            <a:spLocks noGrp="1"/>
+          </p:cNvSpPr>
+          <p:nvPr>
+            <p:ph type="title"/>
+          </p:nvPr>
+        </p:nvSpPr>
+        <p:spPr/>
+        <p:txBody>
+          <a:bodyPr/>
+          <a:lstStyle/>
+          <a:p>
+            <a:r>
+              <a:rPr lang="zh-TW" altLang="en-US" dirty="0">
+                <a:latin typeface="標楷體" panose="03000509000000000000" pitchFamily="65" charset="-120"/>
+                <a:ea typeface="標楷體" panose="03000509000000000000" pitchFamily="65" charset="-120"/>
+              </a:rPr>
+              <a:t>分工</a:t>
+            </a:r>
+          </a:p>
+        </p:txBody>
+      </p:sp>
+      <p:sp>
+        <p:nvSpPr>
+          <p:cNvPr id="3" name="內容版面配置區 2">
+            <a:extLst>
+              <a:ext uri="{FF2B5EF4-FFF2-40B4-BE49-F238E27FC236}">
+                <a16:creationId xmlns:a16="http://schemas.microsoft.com/office/drawing/2014/main" id="{802C3C8A-F8C1-4E2D-86E5-BF3F8F3FAE2A}"/>
+              </a:ext>
+            </a:extLst>
+          </p:cNvPr>
+          <p:cNvSpPr>
+            <a:spLocks noGrp="1"/>
+          </p:cNvSpPr>
+          <p:nvPr>
+            <p:ph idx="1"/>
+          </p:nvPr>
+        </p:nvSpPr>
+        <p:spPr/>
+        <p:txBody>
+          <a:bodyPr/>
+          <a:lstStyle/>
+          <a:p>
+            <a:r>
+              <a:rPr lang="zh-TW" altLang="en-US" dirty="0">
+                <a:latin typeface="標楷體" panose="03000509000000000000" pitchFamily="65" charset="-120"/>
+                <a:ea typeface="標楷體" panose="03000509000000000000" pitchFamily="65" charset="-120"/>
+              </a:rPr>
+              <a:t>許皓翔：</a:t>
+            </a:r>
+            <a:r>
+              <a:rPr lang="en-US" altLang="zh-TW" dirty="0">
+                <a:latin typeface="Times New Roman" panose="02020603050405020304" pitchFamily="18" charset="0"/>
+                <a:cs typeface="Times New Roman" panose="02020603050405020304" pitchFamily="18" charset="0"/>
+              </a:rPr>
+              <a:t> </a:t>
+            </a:r>
+            <a:r>
+              <a:rPr lang="zh-TW" altLang="en-US" dirty="0">
+                <a:latin typeface="標楷體" panose="03000509000000000000" pitchFamily="65" charset="-120"/>
+                <a:ea typeface="標楷體" panose="03000509000000000000" pitchFamily="65" charset="-120"/>
+                <a:cs typeface="Times New Roman" panose="02020603050405020304" pitchFamily="18" charset="0"/>
+              </a:rPr>
+              <a:t>登入與主要功能</a:t>
+            </a:r>
+            <a:r>
+              <a:rPr lang="en-US" altLang="zh-TW" dirty="0">
+                <a:latin typeface="Times New Roman" panose="02020603050405020304" pitchFamily="18" charset="0"/>
+                <a:cs typeface="Times New Roman" panose="02020603050405020304" pitchFamily="18" charset="0"/>
+              </a:rPr>
+              <a:t>Google Sheet</a:t>
+            </a:r>
+            <a:r>
+              <a:rPr lang="zh-TW" altLang="en-US" dirty="0">
+                <a:latin typeface="Times New Roman" panose="02020603050405020304" pitchFamily="18" charset="0"/>
+                <a:cs typeface="Times New Roman" panose="02020603050405020304" pitchFamily="18" charset="0"/>
+              </a:rPr>
+              <a:t>、</a:t>
+            </a:r>
+            <a:r>
+              <a:rPr lang="en-US" altLang="zh-TW" dirty="0">
+                <a:latin typeface="Times New Roman" panose="02020603050405020304" pitchFamily="18" charset="0"/>
+                <a:cs typeface="Times New Roman" panose="02020603050405020304" pitchFamily="18" charset="0"/>
+              </a:rPr>
+              <a:t>Google Chart</a:t>
+            </a:r>
+            <a:r>
+              <a:rPr lang="zh-TW" altLang="en-US" dirty="0">
+                <a:latin typeface="Times New Roman" panose="02020603050405020304" pitchFamily="18" charset="0"/>
+                <a:cs typeface="Times New Roman" panose="02020603050405020304" pitchFamily="18" charset="0"/>
+              </a:rPr>
+              <a:t>  </a:t>
+            </a:r>
+            <a:r>
+              <a:rPr lang="en-US" altLang="zh-TW" dirty="0">
+                <a:latin typeface="Times New Roman" panose="02020603050405020304" pitchFamily="18" charset="0"/>
+                <a:cs typeface="Times New Roman" panose="02020603050405020304" pitchFamily="18" charset="0"/>
+              </a:rPr>
+              <a:t>CRUD</a:t>
+            </a:r>
+            <a:r>
+              <a:rPr lang="zh-TW" altLang="en-US" dirty="0">
+                <a:latin typeface="標楷體" panose="03000509000000000000" pitchFamily="65" charset="-120"/>
+                <a:ea typeface="標楷體" panose="03000509000000000000" pitchFamily="65" charset="-120"/>
+                <a:cs typeface="Times New Roman" panose="02020603050405020304" pitchFamily="18" charset="0"/>
+              </a:rPr>
+              <a:t>與其中的資料格式前處理</a:t>
+            </a:r>
+            <a:r>
+              <a:rPr lang="zh-TW" altLang="en-US" dirty="0">
+                <a:latin typeface="Times New Roman" panose="02020603050405020304" pitchFamily="18" charset="0"/>
+                <a:cs typeface="Times New Roman" panose="02020603050405020304" pitchFamily="18" charset="0"/>
+              </a:rPr>
+              <a:t>、</a:t>
+            </a:r>
+            <a:r>
+              <a:rPr lang="zh-TW" altLang="en-US" dirty="0">
+                <a:latin typeface="標楷體" panose="03000509000000000000" pitchFamily="65" charset="-120"/>
+                <a:ea typeface="標楷體" panose="03000509000000000000" pitchFamily="65" charset="-120"/>
+                <a:cs typeface="Times New Roman" panose="02020603050405020304" pitchFamily="18" charset="0"/>
+              </a:rPr>
+              <a:t>前端網站架構設計實作與測試、後端表單連接與處理。</a:t>
+            </a:r>
+            <a:endParaRPr lang="en-US" altLang="zh-TW" dirty="0">
+              <a:latin typeface="標楷體" panose="03000509000000000000" pitchFamily="65" charset="-120"/>
+              <a:ea typeface="標楷體" panose="03000509000000000000" pitchFamily="65" charset="-120"/>
+              <a:cs typeface="Times New Roman" panose="02020603050405020304" pitchFamily="18" charset="0"/>
+            </a:endParaRPr>
+          </a:p>
+          <a:p>
+            <a:r>
+              <a:rPr lang="zh-TW" altLang="en-US" dirty="0">
+                <a:latin typeface="標楷體" panose="03000509000000000000" pitchFamily="65" charset="-120"/>
+                <a:ea typeface="標楷體" panose="03000509000000000000" pitchFamily="65" charset="-120"/>
+                <a:cs typeface="Times New Roman" panose="02020603050405020304" pitchFamily="18" charset="0"/>
+              </a:rPr>
+              <a:t>黃祖麟：前端網站架構設計與測試、</a:t>
+            </a:r>
+            <a:r>
+              <a:rPr lang="en-US" altLang="zh-TW" dirty="0">
+                <a:latin typeface="Times New Roman" panose="02020603050405020304" pitchFamily="18" charset="0"/>
+                <a:ea typeface="標楷體" panose="03000509000000000000" pitchFamily="65" charset="-120"/>
+                <a:cs typeface="Times New Roman" panose="02020603050405020304" pitchFamily="18" charset="0"/>
+              </a:rPr>
+              <a:t>FB</a:t>
+            </a:r>
+            <a:r>
+              <a:rPr lang="zh-TW" altLang="en-US" dirty="0">
+                <a:latin typeface="Times New Roman" panose="02020603050405020304" pitchFamily="18" charset="0"/>
+                <a:ea typeface="標楷體" panose="03000509000000000000" pitchFamily="65" charset="-120"/>
+                <a:cs typeface="Times New Roman" panose="02020603050405020304" pitchFamily="18" charset="0"/>
+              </a:rPr>
+              <a:t>、</a:t>
+            </a:r>
+            <a:r>
+              <a:rPr lang="en-US" altLang="zh-TW" dirty="0">
+                <a:latin typeface="Times New Roman" panose="02020603050405020304" pitchFamily="18" charset="0"/>
+                <a:ea typeface="標楷體" panose="03000509000000000000" pitchFamily="65" charset="-120"/>
+                <a:cs typeface="Times New Roman" panose="02020603050405020304" pitchFamily="18" charset="0"/>
+              </a:rPr>
+              <a:t>IG</a:t>
+            </a:r>
+            <a:r>
+              <a:rPr lang="zh-TW" altLang="en-US" dirty="0">
+                <a:latin typeface="Times New Roman" panose="02020603050405020304" pitchFamily="18" charset="0"/>
+                <a:ea typeface="標楷體" panose="03000509000000000000" pitchFamily="65" charset="-120"/>
+                <a:cs typeface="Times New Roman" panose="02020603050405020304" pitchFamily="18" charset="0"/>
+              </a:rPr>
+              <a:t>、連接外部網站</a:t>
+            </a:r>
+          </a:p>
+        </p:txBody>
+      </p:sp>
+    </p:spTree>
+    <p:extLst>
+      <p:ext uri="{BB962C8B-B14F-4D97-AF65-F5344CB8AC3E}">
+        <p14:creationId xmlns:p14="http://schemas.microsoft.com/office/powerpoint/2010/main" val="958456341"/>
+      </p:ext>
+    </p:extLst>
+  </p:cSld>
+  <p:clrMapOvr>
+    <a:masterClrMapping/>
+  </p:clrMapOvr>
+</p:sld>
+</file>
+
+<file path=ppt/slides/slide13.xml><?xml version="1.0" encoding="utf-8"?>
+<p:sld xmlns:a="http://schemas.openxmlformats.org/drawingml/2006/main" xmlns:r="http://schemas.openxmlformats.org/officeDocument/2006/relationships" xmlns:p="http://schemas.openxmlformats.org/presentationml/2006/main">
+  <p:cSld>
+    <p:spTree>
+      <p:nvGrpSpPr>
+        <p:cNvPr id="1" name=""/>
+        <p:cNvGrpSpPr/>
+        <p:nvPr/>
+      </p:nvGrpSpPr>
+      <p:grpSpPr>
+        <a:xfrm>
+          <a:off x="0" y="0"/>
+          <a:ext cx="0" cy="0"/>
+          <a:chOff x="0" y="0"/>
+          <a:chExt cx="0" cy="0"/>
+        </a:xfrm>
+      </p:grpSpPr>
+      <p:sp>
+        <p:nvSpPr>
+          <p:cNvPr id="2" name="標題 1">
+            <a:extLst>
+              <a:ext uri="{FF2B5EF4-FFF2-40B4-BE49-F238E27FC236}">
+                <a16:creationId xmlns:a16="http://schemas.microsoft.com/office/drawing/2014/main" id="{5D5E097E-37B6-4F2E-8A6A-D065C9BAE67E}"/>
+              </a:ext>
+            </a:extLst>
+          </p:cNvPr>
+          <p:cNvSpPr>
+            <a:spLocks noGrp="1"/>
+          </p:cNvSpPr>
+          <p:nvPr>
+            <p:ph type="title"/>
+          </p:nvPr>
+        </p:nvSpPr>
+        <p:spPr/>
+        <p:txBody>
+          <a:bodyPr/>
+          <a:lstStyle/>
+          <a:p>
+            <a:r>
+              <a:rPr lang="en-US" altLang="zh-TW" dirty="0">
+                <a:latin typeface="Times New Roman" panose="02020603050405020304" pitchFamily="18" charset="0"/>
+                <a:cs typeface="Times New Roman" panose="02020603050405020304" pitchFamily="18" charset="0"/>
+              </a:rPr>
+              <a:t>THE</a:t>
+            </a:r>
+            <a:r>
+              <a:rPr lang="zh-TW" altLang="en-US" dirty="0">
+                <a:latin typeface="Times New Roman" panose="02020603050405020304" pitchFamily="18" charset="0"/>
+                <a:cs typeface="Times New Roman" panose="02020603050405020304" pitchFamily="18" charset="0"/>
+              </a:rPr>
+              <a:t> </a:t>
+            </a:r>
+            <a:r>
+              <a:rPr lang="en-US" altLang="zh-TW" dirty="0">
+                <a:latin typeface="Times New Roman" panose="02020603050405020304" pitchFamily="18" charset="0"/>
+                <a:cs typeface="Times New Roman" panose="02020603050405020304" pitchFamily="18" charset="0"/>
+              </a:rPr>
+              <a:t>END</a:t>
+            </a:r>
+            <a:endParaRPr lang="zh-TW" altLang="en-US" dirty="0">
+              <a:latin typeface="Times New Roman" panose="02020603050405020304" pitchFamily="18" charset="0"/>
+              <a:cs typeface="Times New Roman" panose="02020603050405020304" pitchFamily="18" charset="0"/>
+            </a:endParaRPr>
+          </a:p>
+        </p:txBody>
+      </p:sp>
+    </p:spTree>
+    <p:extLst>
+      <p:ext uri="{BB962C8B-B14F-4D97-AF65-F5344CB8AC3E}">
+        <p14:creationId xmlns:p14="http://schemas.microsoft.com/office/powerpoint/2010/main" val="983516014"/>
+      </p:ext>
+    </p:extLst>
+  </p:cSld>
+  <p:clrMapOvr>
+    <a:masterClrMapping/>
+  </p:clrMapOvr>
+</p:sld>
+</file>
+
 <file path=ppt/slides/slide2.xml><?xml version="1.0" encoding="utf-8"?>
 <p:sld xmlns:a="http://schemas.openxmlformats.org/drawingml/2006/main" xmlns:r="http://schemas.openxmlformats.org/officeDocument/2006/relationships" xmlns:p="http://schemas.openxmlformats.org/presentationml/2006/main">
   <p:cSld>
@@ -6053,7 +6882,7 @@
                 <a:latin typeface="標楷體" panose="03000509000000000000" pitchFamily="65" charset="-120"/>
                 <a:ea typeface="標楷體" panose="03000509000000000000" pitchFamily="65" charset="-120"/>
               </a:rPr>
-              <a:t>網站架構與主要功能</a:t>
+              <a:t>動機</a:t>
             </a:r>
           </a:p>
         </p:txBody>
@@ -6071,17 +6900,14 @@
             <a:spLocks noGrp="1"/>
           </p:cNvSpPr>
           <p:nvPr>
-            <p:ph sz="half" idx="1"/>
-          </p:nvPr>
-        </p:nvSpPr>
-        <p:spPr>
-          <a:xfrm>
-            <a:off x="914400" y="2441446"/>
-            <a:ext cx="5181600" cy="4667250"/>
-          </a:xfrm>
-        </p:spPr>
-        <p:txBody>
-          <a:bodyPr/>
+            <p:ph idx="1"/>
+          </p:nvPr>
+        </p:nvSpPr>
+        <p:spPr/>
+        <p:txBody>
+          <a:bodyPr>
+            <a:normAutofit/>
+          </a:bodyPr>
           <a:lstStyle/>
           <a:p>
             <a:r>
@@ -6089,7 +6915,7 @@
                 <a:latin typeface="標楷體" panose="03000509000000000000" pitchFamily="65" charset="-120"/>
                 <a:ea typeface="標楷體" panose="03000509000000000000" pitchFamily="65" charset="-120"/>
               </a:rPr>
-              <a:t>登入入口</a:t>
+              <a:t>健康是近代人類社會所關注的重要議題之一</a:t>
             </a:r>
             <a:endParaRPr lang="en-US" altLang="zh-TW" dirty="0">
               <a:latin typeface="標楷體" panose="03000509000000000000" pitchFamily="65" charset="-120"/>
@@ -6097,279 +6923,24 @@
             </a:endParaRPr>
           </a:p>
           <a:p>
-            <a:pPr lvl="1">
-              <a:buFont typeface="Wingdings" panose="05000000000000000000" pitchFamily="2" charset="2"/>
-              <a:buChar char="Ø"/>
-            </a:pPr>
             <a:r>
               <a:rPr lang="zh-TW" altLang="en-US" dirty="0">
                 <a:latin typeface="標楷體" panose="03000509000000000000" pitchFamily="65" charset="-120"/>
                 <a:ea typeface="標楷體" panose="03000509000000000000" pitchFamily="65" charset="-120"/>
               </a:rPr>
-              <a:t>登入、註冊</a:t>
+              <a:t>追求健康，我們可以從飲食與運動下手</a:t>
             </a:r>
             <a:endParaRPr lang="en-US" altLang="zh-TW" dirty="0">
               <a:latin typeface="標楷體" panose="03000509000000000000" pitchFamily="65" charset="-120"/>
               <a:ea typeface="標楷體" panose="03000509000000000000" pitchFamily="65" charset="-120"/>
             </a:endParaRPr>
           </a:p>
-          <a:p>
-            <a:r>
-              <a:rPr lang="zh-TW" altLang="en-US" dirty="0">
-                <a:latin typeface="標楷體" panose="03000509000000000000" pitchFamily="65" charset="-120"/>
-                <a:ea typeface="標楷體" panose="03000509000000000000" pitchFamily="65" charset="-120"/>
-              </a:rPr>
-              <a:t>主頁面</a:t>
-            </a:r>
-            <a:endParaRPr lang="en-US" altLang="zh-TW" dirty="0">
-              <a:latin typeface="標楷體" panose="03000509000000000000" pitchFamily="65" charset="-120"/>
-              <a:ea typeface="標楷體" panose="03000509000000000000" pitchFamily="65" charset="-120"/>
-            </a:endParaRPr>
-          </a:p>
-          <a:p>
-            <a:pPr lvl="1">
-              <a:buFont typeface="Wingdings" panose="05000000000000000000" pitchFamily="2" charset="2"/>
-              <a:buChar char="Ø"/>
-            </a:pPr>
-            <a:r>
-              <a:rPr lang="zh-TW" altLang="en-US" dirty="0">
-                <a:latin typeface="標楷體" panose="03000509000000000000" pitchFamily="65" charset="-120"/>
-                <a:ea typeface="標楷體" panose="03000509000000000000" pitchFamily="65" charset="-120"/>
-              </a:rPr>
-              <a:t>呈現</a:t>
-            </a:r>
-            <a:r>
-              <a:rPr lang="en-US" altLang="zh-TW" dirty="0">
-                <a:latin typeface="標楷體" panose="03000509000000000000" pitchFamily="65" charset="-120"/>
-                <a:ea typeface="標楷體" panose="03000509000000000000" pitchFamily="65" charset="-120"/>
-              </a:rPr>
-              <a:t>3</a:t>
-            </a:r>
-            <a:r>
-              <a:rPr lang="zh-TW" altLang="en-US" dirty="0">
-                <a:latin typeface="標楷體" panose="03000509000000000000" pitchFamily="65" charset="-120"/>
-                <a:ea typeface="標楷體" panose="03000509000000000000" pitchFamily="65" charset="-120"/>
-              </a:rPr>
-              <a:t>主要記錄功能與其他功能</a:t>
-            </a:r>
-            <a:endParaRPr lang="en-US" altLang="zh-TW" dirty="0">
-              <a:latin typeface="標楷體" panose="03000509000000000000" pitchFamily="65" charset="-120"/>
-              <a:ea typeface="標楷體" panose="03000509000000000000" pitchFamily="65" charset="-120"/>
-            </a:endParaRPr>
-          </a:p>
-          <a:p>
-            <a:r>
-              <a:rPr lang="zh-TW" altLang="en-US" dirty="0">
-                <a:latin typeface="標楷體" panose="03000509000000000000" pitchFamily="65" charset="-120"/>
-                <a:ea typeface="標楷體" panose="03000509000000000000" pitchFamily="65" charset="-120"/>
-              </a:rPr>
-              <a:t>熱量紀錄</a:t>
-            </a:r>
-            <a:endParaRPr lang="en-US" altLang="zh-TW" dirty="0">
-              <a:latin typeface="標楷體" panose="03000509000000000000" pitchFamily="65" charset="-120"/>
-              <a:ea typeface="標楷體" panose="03000509000000000000" pitchFamily="65" charset="-120"/>
-            </a:endParaRPr>
-          </a:p>
-          <a:p>
-            <a:pPr lvl="1">
-              <a:buFont typeface="Wingdings" panose="05000000000000000000" pitchFamily="2" charset="2"/>
-              <a:buChar char="Ø"/>
-            </a:pPr>
-            <a:r>
-              <a:rPr lang="zh-TW" altLang="en-US" dirty="0">
-                <a:latin typeface="標楷體" panose="03000509000000000000" pitchFamily="65" charset="-120"/>
-                <a:ea typeface="標楷體" panose="03000509000000000000" pitchFamily="65" charset="-120"/>
-              </a:rPr>
-              <a:t>各營養標示表、圓餅圖</a:t>
-            </a:r>
-            <a:endParaRPr lang="en-US" altLang="zh-TW" dirty="0">
-              <a:latin typeface="標楷體" panose="03000509000000000000" pitchFamily="65" charset="-120"/>
-              <a:ea typeface="標楷體" panose="03000509000000000000" pitchFamily="65" charset="-120"/>
-            </a:endParaRPr>
-          </a:p>
-          <a:p>
-            <a:r>
-              <a:rPr lang="zh-TW" altLang="en-US" dirty="0">
-                <a:latin typeface="標楷體" panose="03000509000000000000" pitchFamily="65" charset="-120"/>
-                <a:ea typeface="標楷體" panose="03000509000000000000" pitchFamily="65" charset="-120"/>
-              </a:rPr>
-              <a:t>運動紀錄</a:t>
-            </a:r>
-            <a:endParaRPr lang="en-US" altLang="zh-TW" dirty="0">
-              <a:latin typeface="標楷體" panose="03000509000000000000" pitchFamily="65" charset="-120"/>
-              <a:ea typeface="標楷體" panose="03000509000000000000" pitchFamily="65" charset="-120"/>
-            </a:endParaRPr>
-          </a:p>
-          <a:p>
-            <a:pPr lvl="1">
-              <a:buFont typeface="Wingdings" panose="05000000000000000000" pitchFamily="2" charset="2"/>
-              <a:buChar char="Ø"/>
-            </a:pPr>
-            <a:r>
-              <a:rPr lang="zh-TW" altLang="en-US" dirty="0">
-                <a:latin typeface="標楷體" panose="03000509000000000000" pitchFamily="65" charset="-120"/>
-                <a:ea typeface="標楷體" panose="03000509000000000000" pitchFamily="65" charset="-120"/>
-              </a:rPr>
-              <a:t>種類、時長、圓餅圖</a:t>
-            </a:r>
-            <a:endParaRPr lang="en-US" altLang="zh-TW" dirty="0">
-              <a:latin typeface="標楷體" panose="03000509000000000000" pitchFamily="65" charset="-120"/>
-              <a:ea typeface="標楷體" panose="03000509000000000000" pitchFamily="65" charset="-120"/>
-            </a:endParaRPr>
-          </a:p>
-        </p:txBody>
-      </p:sp>
-      <p:sp>
-        <p:nvSpPr>
-          <p:cNvPr id="4" name="內容版面配置區 3">
-            <a:extLst>
-              <a:ext uri="{FF2B5EF4-FFF2-40B4-BE49-F238E27FC236}">
-                <a16:creationId xmlns:a16="http://schemas.microsoft.com/office/drawing/2014/main" id="{9C7FB38E-CD31-453F-BD6A-555192D9DC42}"/>
-              </a:ext>
-            </a:extLst>
-          </p:cNvPr>
-          <p:cNvSpPr>
-            <a:spLocks noGrp="1"/>
-          </p:cNvSpPr>
-          <p:nvPr>
-            <p:ph sz="half" idx="2"/>
-          </p:nvPr>
-        </p:nvSpPr>
-        <p:spPr>
-          <a:xfrm>
-            <a:off x="6096000" y="2441446"/>
-            <a:ext cx="5181600" cy="4667250"/>
-          </a:xfrm>
-        </p:spPr>
-        <p:txBody>
-          <a:bodyPr/>
-          <a:lstStyle/>
-          <a:p>
-            <a:r>
-              <a:rPr lang="zh-TW" altLang="en-US" dirty="0">
-                <a:latin typeface="標楷體" panose="03000509000000000000" pitchFamily="65" charset="-120"/>
-                <a:ea typeface="標楷體" panose="03000509000000000000" pitchFamily="65" charset="-120"/>
-              </a:rPr>
-              <a:t>體重紀錄</a:t>
-            </a:r>
-            <a:endParaRPr lang="en-US" altLang="zh-TW" dirty="0">
-              <a:latin typeface="標楷體" panose="03000509000000000000" pitchFamily="65" charset="-120"/>
-              <a:ea typeface="標楷體" panose="03000509000000000000" pitchFamily="65" charset="-120"/>
-            </a:endParaRPr>
-          </a:p>
-          <a:p>
-            <a:pPr lvl="1">
-              <a:buFont typeface="Wingdings" panose="05000000000000000000" pitchFamily="2" charset="2"/>
-              <a:buChar char="Ø"/>
-            </a:pPr>
-            <a:r>
-              <a:rPr lang="zh-TW" altLang="en-US" dirty="0">
-                <a:latin typeface="標楷體" panose="03000509000000000000" pitchFamily="65" charset="-120"/>
-                <a:ea typeface="標楷體" panose="03000509000000000000" pitchFamily="65" charset="-120"/>
-              </a:rPr>
-              <a:t>身高體重、</a:t>
-            </a:r>
-            <a:r>
-              <a:rPr lang="en-US" altLang="zh-TW" dirty="0">
-                <a:latin typeface="標楷體" panose="03000509000000000000" pitchFamily="65" charset="-120"/>
-                <a:ea typeface="標楷體" panose="03000509000000000000" pitchFamily="65" charset="-120"/>
-              </a:rPr>
-              <a:t>BMI</a:t>
-            </a:r>
-            <a:r>
-              <a:rPr lang="zh-TW" altLang="en-US" dirty="0">
-                <a:latin typeface="標楷體" panose="03000509000000000000" pitchFamily="65" charset="-120"/>
-                <a:ea typeface="標楷體" panose="03000509000000000000" pitchFamily="65" charset="-120"/>
-              </a:rPr>
-              <a:t>以及折線圖</a:t>
-            </a:r>
-            <a:endParaRPr lang="en-US" altLang="zh-TW" dirty="0">
-              <a:latin typeface="標楷體" panose="03000509000000000000" pitchFamily="65" charset="-120"/>
-              <a:ea typeface="標楷體" panose="03000509000000000000" pitchFamily="65" charset="-120"/>
-            </a:endParaRPr>
-          </a:p>
-          <a:p>
-            <a:r>
-              <a:rPr lang="zh-TW" altLang="en-US" dirty="0">
-                <a:latin typeface="標楷體" panose="03000509000000000000" pitchFamily="65" charset="-120"/>
-                <a:ea typeface="標楷體" panose="03000509000000000000" pitchFamily="65" charset="-120"/>
-              </a:rPr>
-              <a:t>減肥金句</a:t>
-            </a:r>
-            <a:endParaRPr lang="en-US" altLang="zh-TW" dirty="0">
-              <a:latin typeface="標楷體" panose="03000509000000000000" pitchFamily="65" charset="-120"/>
-              <a:ea typeface="標楷體" panose="03000509000000000000" pitchFamily="65" charset="-120"/>
-            </a:endParaRPr>
-          </a:p>
-          <a:p>
-            <a:pPr lvl="1">
-              <a:buFont typeface="Wingdings" panose="05000000000000000000" pitchFamily="2" charset="2"/>
-              <a:buChar char="Ø"/>
-            </a:pPr>
-            <a:r>
-              <a:rPr lang="zh-TW" altLang="en-US" dirty="0">
-                <a:latin typeface="標楷體" panose="03000509000000000000" pitchFamily="65" charset="-120"/>
-                <a:ea typeface="標楷體" panose="03000509000000000000" pitchFamily="65" charset="-120"/>
-              </a:rPr>
-              <a:t>可以自己新增鼓勵自己的話或是注意事項</a:t>
-            </a:r>
-            <a:endParaRPr lang="en-US" altLang="zh-TW" dirty="0">
-              <a:latin typeface="標楷體" panose="03000509000000000000" pitchFamily="65" charset="-120"/>
-              <a:ea typeface="標楷體" panose="03000509000000000000" pitchFamily="65" charset="-120"/>
-            </a:endParaRPr>
-          </a:p>
-          <a:p>
-            <a:r>
-              <a:rPr lang="zh-TW" altLang="en-US" dirty="0">
-                <a:latin typeface="標楷體" panose="03000509000000000000" pitchFamily="65" charset="-120"/>
-                <a:ea typeface="標楷體" panose="03000509000000000000" pitchFamily="65" charset="-120"/>
-              </a:rPr>
-              <a:t>飲食規劃</a:t>
-            </a:r>
-            <a:endParaRPr lang="en-US" altLang="zh-TW" dirty="0">
-              <a:latin typeface="標楷體" panose="03000509000000000000" pitchFamily="65" charset="-120"/>
-              <a:ea typeface="標楷體" panose="03000509000000000000" pitchFamily="65" charset="-120"/>
-            </a:endParaRPr>
-          </a:p>
-          <a:p>
-            <a:pPr lvl="1"/>
-            <a:r>
-              <a:rPr lang="zh-TW" altLang="en-US" dirty="0">
-                <a:latin typeface="標楷體" panose="03000509000000000000" pitchFamily="65" charset="-120"/>
-                <a:ea typeface="標楷體" panose="03000509000000000000" pitchFamily="65" charset="-120"/>
-              </a:rPr>
-              <a:t>飲食方法</a:t>
-            </a:r>
-            <a:endParaRPr lang="en-US" altLang="zh-TW" dirty="0">
-              <a:latin typeface="標楷體" panose="03000509000000000000" pitchFamily="65" charset="-120"/>
-              <a:ea typeface="標楷體" panose="03000509000000000000" pitchFamily="65" charset="-120"/>
-            </a:endParaRPr>
-          </a:p>
-          <a:p>
-            <a:r>
-              <a:rPr lang="zh-TW" altLang="en-US" dirty="0">
-                <a:latin typeface="標楷體" panose="03000509000000000000" pitchFamily="65" charset="-120"/>
-                <a:ea typeface="標楷體" panose="03000509000000000000" pitchFamily="65" charset="-120"/>
-              </a:rPr>
-              <a:t>採購清單</a:t>
-            </a:r>
-            <a:endParaRPr lang="en-US" altLang="zh-TW" dirty="0">
-              <a:latin typeface="標楷體" panose="03000509000000000000" pitchFamily="65" charset="-120"/>
-              <a:ea typeface="標楷體" panose="03000509000000000000" pitchFamily="65" charset="-120"/>
-            </a:endParaRPr>
-          </a:p>
-          <a:p>
-            <a:endParaRPr lang="en-US" altLang="zh-TW" dirty="0">
-              <a:latin typeface="標楷體" panose="03000509000000000000" pitchFamily="65" charset="-120"/>
-              <a:ea typeface="標楷體" panose="03000509000000000000" pitchFamily="65" charset="-120"/>
-            </a:endParaRPr>
-          </a:p>
         </p:txBody>
       </p:sp>
     </p:spTree>
     <p:extLst>
       <p:ext uri="{BB962C8B-B14F-4D97-AF65-F5344CB8AC3E}">
-        <p14:creationId xmlns:p14="http://schemas.microsoft.com/office/powerpoint/2010/main" val="788768322"/>
+        <p14:creationId xmlns:p14="http://schemas.microsoft.com/office/powerpoint/2010/main" val="2507474053"/>
       </p:ext>
     </p:extLst>
   </p:cSld>
@@ -6401,7 +6972,7 @@
           <p:cNvPr id="2" name="標題 1">
             <a:extLst>
               <a:ext uri="{FF2B5EF4-FFF2-40B4-BE49-F238E27FC236}">
-                <a16:creationId xmlns:a16="http://schemas.microsoft.com/office/drawing/2014/main" id="{2369A219-1F70-457D-9E89-1EE29F1DF1FC}"/>
+                <a16:creationId xmlns:a16="http://schemas.microsoft.com/office/drawing/2014/main" id="{8E6D23BA-7DCD-4C1C-A799-D516563F12CD}"/>
               </a:ext>
             </a:extLst>
           </p:cNvPr>
@@ -6417,12 +6988,13 @@
           <a:bodyPr/>
           <a:lstStyle/>
           <a:p>
+            <a:pPr algn="ctr"/>
             <a:r>
               <a:rPr lang="zh-TW" altLang="en-US" dirty="0">
                 <a:latin typeface="標楷體" panose="03000509000000000000" pitchFamily="65" charset="-120"/>
                 <a:ea typeface="標楷體" panose="03000509000000000000" pitchFamily="65" charset="-120"/>
               </a:rPr>
-              <a:t>網站特色</a:t>
+              <a:t>網站架構與主要功能</a:t>
             </a:r>
           </a:p>
         </p:txBody>
@@ -6432,7 +7004,7 @@
           <p:cNvPr id="3" name="內容版面配置區 2">
             <a:extLst>
               <a:ext uri="{FF2B5EF4-FFF2-40B4-BE49-F238E27FC236}">
-                <a16:creationId xmlns:a16="http://schemas.microsoft.com/office/drawing/2014/main" id="{5F4EF5D5-96A3-44FB-B188-D9A4A61F6016}"/>
+                <a16:creationId xmlns:a16="http://schemas.microsoft.com/office/drawing/2014/main" id="{BC014D26-C962-4F5D-85A6-D13CF2D1EE6D}"/>
               </a:ext>
             </a:extLst>
           </p:cNvPr>
@@ -6440,14 +7012,17 @@
             <a:spLocks noGrp="1"/>
           </p:cNvSpPr>
           <p:nvPr>
-            <p:ph idx="1"/>
-          </p:nvPr>
-        </p:nvSpPr>
-        <p:spPr/>
-        <p:txBody>
-          <a:bodyPr>
-            <a:normAutofit/>
-          </a:bodyPr>
+            <p:ph sz="half" idx="1"/>
+          </p:nvPr>
+        </p:nvSpPr>
+        <p:spPr>
+          <a:xfrm>
+            <a:off x="914400" y="2441446"/>
+            <a:ext cx="5181600" cy="4667250"/>
+          </a:xfrm>
+        </p:spPr>
+        <p:txBody>
+          <a:bodyPr/>
           <a:lstStyle/>
           <a:p>
             <a:r>
@@ -6455,22 +7030,7 @@
                 <a:latin typeface="標楷體" panose="03000509000000000000" pitchFamily="65" charset="-120"/>
                 <a:ea typeface="標楷體" panose="03000509000000000000" pitchFamily="65" charset="-120"/>
               </a:rPr>
-              <a:t>結合登入、</a:t>
-            </a:r>
-            <a:r>
-              <a:rPr lang="en-US" altLang="zh-TW" dirty="0">
-                <a:latin typeface="Times New Roman" panose="02020603050405020304" pitchFamily="18" charset="0"/>
-                <a:ea typeface="標楷體" panose="03000509000000000000" pitchFamily="65" charset="-120"/>
-                <a:cs typeface="Times New Roman" panose="02020603050405020304" pitchFamily="18" charset="0"/>
-              </a:rPr>
-              <a:t>Google Sheet</a:t>
-            </a:r>
-            <a:r>
-              <a:rPr lang="zh-TW" altLang="en-US" dirty="0">
-                <a:latin typeface="標楷體" panose="03000509000000000000" pitchFamily="65" charset="-120"/>
-                <a:ea typeface="標楷體" panose="03000509000000000000" pitchFamily="65" charset="-120"/>
-              </a:rPr>
-              <a:t>，方便使用者紀錄自己的情況。</a:t>
+              <a:t>登入入口</a:t>
             </a:r>
             <a:endParaRPr lang="en-US" altLang="zh-TW" dirty="0">
               <a:latin typeface="標楷體" panose="03000509000000000000" pitchFamily="65" charset="-120"/>
@@ -6478,71 +7038,16 @@
             </a:endParaRPr>
           </a:p>
           <a:p>
+            <a:pPr lvl="1">
+              <a:buFont typeface="Wingdings" panose="05000000000000000000" pitchFamily="2" charset="2"/>
+              <a:buChar char="Ø"/>
+            </a:pPr>
             <a:r>
               <a:rPr lang="zh-TW" altLang="en-US" dirty="0">
                 <a:latin typeface="標楷體" panose="03000509000000000000" pitchFamily="65" charset="-120"/>
                 <a:ea typeface="標楷體" panose="03000509000000000000" pitchFamily="65" charset="-120"/>
               </a:rPr>
-              <a:t>以 </a:t>
-            </a:r>
-            <a:r>
-              <a:rPr lang="en-US" altLang="zh-TW" dirty="0">
-                <a:latin typeface="Times New Roman" panose="02020603050405020304" pitchFamily="18" charset="0"/>
-                <a:ea typeface="標楷體" panose="03000509000000000000" pitchFamily="65" charset="-120"/>
-                <a:cs typeface="Times New Roman" panose="02020603050405020304" pitchFamily="18" charset="0"/>
-              </a:rPr>
-              <a:t>Google Sheet</a:t>
-            </a:r>
-            <a:r>
-              <a:rPr lang="zh-TW" altLang="en-US" dirty="0">
-                <a:latin typeface="Times New Roman" panose="02020603050405020304" pitchFamily="18" charset="0"/>
-                <a:ea typeface="標楷體" panose="03000509000000000000" pitchFamily="65" charset="-120"/>
-                <a:cs typeface="Times New Roman" panose="02020603050405020304" pitchFamily="18" charset="0"/>
-              </a:rPr>
-              <a:t> 實現六大功能。</a:t>
-            </a:r>
-            <a:endParaRPr lang="en-US" altLang="zh-TW" dirty="0">
-              <a:latin typeface="Times New Roman" panose="02020603050405020304" pitchFamily="18" charset="0"/>
-              <a:ea typeface="標楷體" panose="03000509000000000000" pitchFamily="65" charset="-120"/>
-              <a:cs typeface="Times New Roman" panose="02020603050405020304" pitchFamily="18" charset="0"/>
-            </a:endParaRPr>
-          </a:p>
-          <a:p>
-            <a:r>
-              <a:rPr lang="zh-TW" altLang="en-US" dirty="0">
-                <a:latin typeface="標楷體" panose="03000509000000000000" pitchFamily="65" charset="-120"/>
-                <a:ea typeface="標楷體" panose="03000509000000000000" pitchFamily="65" charset="-120"/>
-              </a:rPr>
-              <a:t>排版簡單清楚</a:t>
-            </a:r>
-            <a:endParaRPr lang="en-US" altLang="zh-TW" dirty="0">
-              <a:latin typeface="Times New Roman" panose="02020603050405020304" pitchFamily="18" charset="0"/>
-              <a:ea typeface="標楷體" panose="03000509000000000000" pitchFamily="65" charset="-120"/>
-              <a:cs typeface="Times New Roman" panose="02020603050405020304" pitchFamily="18" charset="0"/>
-            </a:endParaRPr>
-          </a:p>
-          <a:p>
-            <a:r>
-              <a:rPr lang="zh-TW" altLang="en-US" dirty="0">
-                <a:latin typeface="標楷體" panose="03000509000000000000" pitchFamily="65" charset="-120"/>
-                <a:ea typeface="標楷體" panose="03000509000000000000" pitchFamily="65" charset="-120"/>
-              </a:rPr>
-              <a:t>與部分手機</a:t>
-            </a:r>
-            <a:r>
-              <a:rPr lang="en-US" altLang="zh-TW" dirty="0">
-                <a:latin typeface="Times New Roman" panose="02020603050405020304" pitchFamily="18" charset="0"/>
-                <a:ea typeface="標楷體" panose="03000509000000000000" pitchFamily="65" charset="-120"/>
-                <a:cs typeface="Times New Roman" panose="02020603050405020304" pitchFamily="18" charset="0"/>
-              </a:rPr>
-              <a:t>app</a:t>
-            </a:r>
-            <a:r>
-              <a:rPr lang="zh-TW" altLang="en-US" dirty="0">
-                <a:latin typeface="標楷體" panose="03000509000000000000" pitchFamily="65" charset="-120"/>
-                <a:ea typeface="標楷體" panose="03000509000000000000" pitchFamily="65" charset="-120"/>
-              </a:rPr>
-              <a:t>比起來，不必多花費儲存空間下載或觀看廣告且多了其他應用。</a:t>
+              <a:t>登入、註冊</a:t>
             </a:r>
             <a:endParaRPr lang="en-US" altLang="zh-TW" dirty="0">
               <a:latin typeface="標楷體" panose="03000509000000000000" pitchFamily="65" charset="-120"/>
@@ -6555,7 +7060,7 @@
                 <a:latin typeface="標楷體" panose="03000509000000000000" pitchFamily="65" charset="-120"/>
                 <a:ea typeface="標楷體" panose="03000509000000000000" pitchFamily="65" charset="-120"/>
               </a:rPr>
-              <a:t>部分功能連接至外部網站，提供便利性。</a:t>
+              <a:t>主頁面</a:t>
             </a:r>
             <a:endParaRPr lang="en-US" altLang="zh-TW" dirty="0">
               <a:latin typeface="標楷體" panose="03000509000000000000" pitchFamily="65" charset="-120"/>
@@ -6563,17 +7068,252 @@
             </a:endParaRPr>
           </a:p>
           <a:p>
-            <a:endParaRPr lang="en-US" altLang="zh-TW" dirty="0"/>
-          </a:p>
-          <a:p>
-            <a:endParaRPr lang="zh-TW" altLang="en-US" dirty="0"/>
+            <a:pPr lvl="1">
+              <a:buFont typeface="Wingdings" panose="05000000000000000000" pitchFamily="2" charset="2"/>
+              <a:buChar char="Ø"/>
+            </a:pPr>
+            <a:r>
+              <a:rPr lang="zh-TW" altLang="en-US" dirty="0">
+                <a:latin typeface="標楷體" panose="03000509000000000000" pitchFamily="65" charset="-120"/>
+                <a:ea typeface="標楷體" panose="03000509000000000000" pitchFamily="65" charset="-120"/>
+              </a:rPr>
+              <a:t>呈現</a:t>
+            </a:r>
+            <a:r>
+              <a:rPr lang="en-US" altLang="zh-TW" dirty="0">
+                <a:latin typeface="標楷體" panose="03000509000000000000" pitchFamily="65" charset="-120"/>
+                <a:ea typeface="標楷體" panose="03000509000000000000" pitchFamily="65" charset="-120"/>
+              </a:rPr>
+              <a:t>3</a:t>
+            </a:r>
+            <a:r>
+              <a:rPr lang="zh-TW" altLang="en-US" dirty="0">
+                <a:latin typeface="標楷體" panose="03000509000000000000" pitchFamily="65" charset="-120"/>
+                <a:ea typeface="標楷體" panose="03000509000000000000" pitchFamily="65" charset="-120"/>
+              </a:rPr>
+              <a:t>主要記錄功能與其他功能</a:t>
+            </a:r>
+            <a:endParaRPr lang="en-US" altLang="zh-TW" dirty="0">
+              <a:latin typeface="標楷體" panose="03000509000000000000" pitchFamily="65" charset="-120"/>
+              <a:ea typeface="標楷體" panose="03000509000000000000" pitchFamily="65" charset="-120"/>
+            </a:endParaRPr>
+          </a:p>
+          <a:p>
+            <a:r>
+              <a:rPr lang="zh-TW" altLang="en-US" dirty="0">
+                <a:latin typeface="標楷體" panose="03000509000000000000" pitchFamily="65" charset="-120"/>
+                <a:ea typeface="標楷體" panose="03000509000000000000" pitchFamily="65" charset="-120"/>
+              </a:rPr>
+              <a:t>熱量紀錄</a:t>
+            </a:r>
+            <a:endParaRPr lang="en-US" altLang="zh-TW" dirty="0">
+              <a:latin typeface="標楷體" panose="03000509000000000000" pitchFamily="65" charset="-120"/>
+              <a:ea typeface="標楷體" panose="03000509000000000000" pitchFamily="65" charset="-120"/>
+            </a:endParaRPr>
+          </a:p>
+          <a:p>
+            <a:pPr lvl="1">
+              <a:buFont typeface="Wingdings" panose="05000000000000000000" pitchFamily="2" charset="2"/>
+              <a:buChar char="Ø"/>
+            </a:pPr>
+            <a:r>
+              <a:rPr lang="zh-TW" altLang="en-US" dirty="0">
+                <a:latin typeface="標楷體" panose="03000509000000000000" pitchFamily="65" charset="-120"/>
+                <a:ea typeface="標楷體" panose="03000509000000000000" pitchFamily="65" charset="-120"/>
+              </a:rPr>
+              <a:t>各營養標示表、圓餅圖</a:t>
+            </a:r>
+            <a:endParaRPr lang="en-US" altLang="zh-TW" dirty="0">
+              <a:latin typeface="標楷體" panose="03000509000000000000" pitchFamily="65" charset="-120"/>
+              <a:ea typeface="標楷體" panose="03000509000000000000" pitchFamily="65" charset="-120"/>
+            </a:endParaRPr>
+          </a:p>
+          <a:p>
+            <a:r>
+              <a:rPr lang="zh-TW" altLang="en-US" dirty="0">
+                <a:latin typeface="標楷體" panose="03000509000000000000" pitchFamily="65" charset="-120"/>
+                <a:ea typeface="標楷體" panose="03000509000000000000" pitchFamily="65" charset="-120"/>
+              </a:rPr>
+              <a:t>運動紀錄</a:t>
+            </a:r>
+            <a:endParaRPr lang="en-US" altLang="zh-TW" dirty="0">
+              <a:latin typeface="標楷體" panose="03000509000000000000" pitchFamily="65" charset="-120"/>
+              <a:ea typeface="標楷體" panose="03000509000000000000" pitchFamily="65" charset="-120"/>
+            </a:endParaRPr>
+          </a:p>
+          <a:p>
+            <a:pPr lvl="1">
+              <a:buFont typeface="Wingdings" panose="05000000000000000000" pitchFamily="2" charset="2"/>
+              <a:buChar char="Ø"/>
+            </a:pPr>
+            <a:r>
+              <a:rPr lang="zh-TW" altLang="en-US" dirty="0">
+                <a:latin typeface="標楷體" panose="03000509000000000000" pitchFamily="65" charset="-120"/>
+                <a:ea typeface="標楷體" panose="03000509000000000000" pitchFamily="65" charset="-120"/>
+              </a:rPr>
+              <a:t>種類、時長、圓餅圖</a:t>
+            </a:r>
+            <a:endParaRPr lang="en-US" altLang="zh-TW" dirty="0">
+              <a:latin typeface="標楷體" panose="03000509000000000000" pitchFamily="65" charset="-120"/>
+              <a:ea typeface="標楷體" panose="03000509000000000000" pitchFamily="65" charset="-120"/>
+            </a:endParaRPr>
+          </a:p>
+        </p:txBody>
+      </p:sp>
+      <p:sp>
+        <p:nvSpPr>
+          <p:cNvPr id="4" name="內容版面配置區 3">
+            <a:extLst>
+              <a:ext uri="{FF2B5EF4-FFF2-40B4-BE49-F238E27FC236}">
+                <a16:creationId xmlns:a16="http://schemas.microsoft.com/office/drawing/2014/main" id="{9C7FB38E-CD31-453F-BD6A-555192D9DC42}"/>
+              </a:ext>
+            </a:extLst>
+          </p:cNvPr>
+          <p:cNvSpPr>
+            <a:spLocks noGrp="1"/>
+          </p:cNvSpPr>
+          <p:nvPr>
+            <p:ph sz="half" idx="2"/>
+          </p:nvPr>
+        </p:nvSpPr>
+        <p:spPr>
+          <a:xfrm>
+            <a:off x="6096000" y="2441446"/>
+            <a:ext cx="5181600" cy="4667250"/>
+          </a:xfrm>
+        </p:spPr>
+        <p:txBody>
+          <a:bodyPr/>
+          <a:lstStyle/>
+          <a:p>
+            <a:r>
+              <a:rPr lang="zh-TW" altLang="en-US" dirty="0">
+                <a:latin typeface="標楷體" panose="03000509000000000000" pitchFamily="65" charset="-120"/>
+                <a:ea typeface="標楷體" panose="03000509000000000000" pitchFamily="65" charset="-120"/>
+              </a:rPr>
+              <a:t>體重紀錄</a:t>
+            </a:r>
+            <a:endParaRPr lang="en-US" altLang="zh-TW" dirty="0">
+              <a:latin typeface="標楷體" panose="03000509000000000000" pitchFamily="65" charset="-120"/>
+              <a:ea typeface="標楷體" panose="03000509000000000000" pitchFamily="65" charset="-120"/>
+            </a:endParaRPr>
+          </a:p>
+          <a:p>
+            <a:pPr lvl="1">
+              <a:buFont typeface="Wingdings" panose="05000000000000000000" pitchFamily="2" charset="2"/>
+              <a:buChar char="Ø"/>
+            </a:pPr>
+            <a:r>
+              <a:rPr lang="zh-TW" altLang="en-US" dirty="0">
+                <a:latin typeface="標楷體" panose="03000509000000000000" pitchFamily="65" charset="-120"/>
+                <a:ea typeface="標楷體" panose="03000509000000000000" pitchFamily="65" charset="-120"/>
+              </a:rPr>
+              <a:t>身高體重、</a:t>
+            </a:r>
+            <a:r>
+              <a:rPr lang="en-US" altLang="zh-TW" dirty="0">
+                <a:latin typeface="標楷體" panose="03000509000000000000" pitchFamily="65" charset="-120"/>
+                <a:ea typeface="標楷體" panose="03000509000000000000" pitchFamily="65" charset="-120"/>
+              </a:rPr>
+              <a:t>BMI</a:t>
+            </a:r>
+            <a:r>
+              <a:rPr lang="zh-TW" altLang="en-US" dirty="0">
+                <a:latin typeface="標楷體" panose="03000509000000000000" pitchFamily="65" charset="-120"/>
+                <a:ea typeface="標楷體" panose="03000509000000000000" pitchFamily="65" charset="-120"/>
+              </a:rPr>
+              <a:t>以及折線圖</a:t>
+            </a:r>
+            <a:endParaRPr lang="en-US" altLang="zh-TW" dirty="0">
+              <a:latin typeface="標楷體" panose="03000509000000000000" pitchFamily="65" charset="-120"/>
+              <a:ea typeface="標楷體" panose="03000509000000000000" pitchFamily="65" charset="-120"/>
+            </a:endParaRPr>
+          </a:p>
+          <a:p>
+            <a:r>
+              <a:rPr lang="zh-TW" altLang="en-US" dirty="0">
+                <a:latin typeface="標楷體" panose="03000509000000000000" pitchFamily="65" charset="-120"/>
+                <a:ea typeface="標楷體" panose="03000509000000000000" pitchFamily="65" charset="-120"/>
+              </a:rPr>
+              <a:t>減肥金句</a:t>
+            </a:r>
+            <a:endParaRPr lang="en-US" altLang="zh-TW" dirty="0">
+              <a:latin typeface="標楷體" panose="03000509000000000000" pitchFamily="65" charset="-120"/>
+              <a:ea typeface="標楷體" panose="03000509000000000000" pitchFamily="65" charset="-120"/>
+            </a:endParaRPr>
+          </a:p>
+          <a:p>
+            <a:pPr lvl="1">
+              <a:buFont typeface="Wingdings" panose="05000000000000000000" pitchFamily="2" charset="2"/>
+              <a:buChar char="Ø"/>
+            </a:pPr>
+            <a:r>
+              <a:rPr lang="zh-TW" altLang="en-US" dirty="0">
+                <a:latin typeface="標楷體" panose="03000509000000000000" pitchFamily="65" charset="-120"/>
+                <a:ea typeface="標楷體" panose="03000509000000000000" pitchFamily="65" charset="-120"/>
+              </a:rPr>
+              <a:t>可以自己新增鼓勵自己的話或是注意事項</a:t>
+            </a:r>
+            <a:endParaRPr lang="en-US" altLang="zh-TW" dirty="0">
+              <a:latin typeface="標楷體" panose="03000509000000000000" pitchFamily="65" charset="-120"/>
+              <a:ea typeface="標楷體" panose="03000509000000000000" pitchFamily="65" charset="-120"/>
+            </a:endParaRPr>
+          </a:p>
+          <a:p>
+            <a:r>
+              <a:rPr lang="zh-TW" altLang="en-US" dirty="0">
+                <a:latin typeface="標楷體" panose="03000509000000000000" pitchFamily="65" charset="-120"/>
+                <a:ea typeface="標楷體" panose="03000509000000000000" pitchFamily="65" charset="-120"/>
+              </a:rPr>
+              <a:t>飲食規劃</a:t>
+            </a:r>
+            <a:endParaRPr lang="en-US" altLang="zh-TW" dirty="0">
+              <a:latin typeface="標楷體" panose="03000509000000000000" pitchFamily="65" charset="-120"/>
+              <a:ea typeface="標楷體" panose="03000509000000000000" pitchFamily="65" charset="-120"/>
+            </a:endParaRPr>
+          </a:p>
+          <a:p>
+            <a:pPr lvl="1">
+              <a:buFont typeface="Wingdings" panose="05000000000000000000" pitchFamily="2" charset="2"/>
+              <a:buChar char="Ø"/>
+            </a:pPr>
+            <a:r>
+              <a:rPr lang="zh-TW" altLang="en-US" dirty="0">
+                <a:latin typeface="標楷體" panose="03000509000000000000" pitchFamily="65" charset="-120"/>
+                <a:ea typeface="標楷體" panose="03000509000000000000" pitchFamily="65" charset="-120"/>
+              </a:rPr>
+              <a:t>飲食方法</a:t>
+            </a:r>
+            <a:endParaRPr lang="en-US" altLang="zh-TW" dirty="0">
+              <a:latin typeface="標楷體" panose="03000509000000000000" pitchFamily="65" charset="-120"/>
+              <a:ea typeface="標楷體" panose="03000509000000000000" pitchFamily="65" charset="-120"/>
+            </a:endParaRPr>
+          </a:p>
+          <a:p>
+            <a:r>
+              <a:rPr lang="zh-TW" altLang="en-US" dirty="0">
+                <a:latin typeface="標楷體" panose="03000509000000000000" pitchFamily="65" charset="-120"/>
+                <a:ea typeface="標楷體" panose="03000509000000000000" pitchFamily="65" charset="-120"/>
+              </a:rPr>
+              <a:t>採購清單</a:t>
+            </a:r>
+            <a:endParaRPr lang="en-US" altLang="zh-TW" dirty="0">
+              <a:latin typeface="標楷體" panose="03000509000000000000" pitchFamily="65" charset="-120"/>
+              <a:ea typeface="標楷體" panose="03000509000000000000" pitchFamily="65" charset="-120"/>
+            </a:endParaRPr>
+          </a:p>
+          <a:p>
+            <a:endParaRPr lang="en-US" altLang="zh-TW" dirty="0">
+              <a:latin typeface="標楷體" panose="03000509000000000000" pitchFamily="65" charset="-120"/>
+              <a:ea typeface="標楷體" panose="03000509000000000000" pitchFamily="65" charset="-120"/>
+            </a:endParaRPr>
           </a:p>
         </p:txBody>
       </p:sp>
     </p:spTree>
     <p:extLst>
       <p:ext uri="{BB962C8B-B14F-4D97-AF65-F5344CB8AC3E}">
-        <p14:creationId xmlns:p14="http://schemas.microsoft.com/office/powerpoint/2010/main" val="2339830431"/>
+        <p14:creationId xmlns:p14="http://schemas.microsoft.com/office/powerpoint/2010/main" val="788768322"/>
       </p:ext>
     </p:extLst>
   </p:cSld>
@@ -6605,7 +7345,7 @@
           <p:cNvPr id="2" name="標題 1">
             <a:extLst>
               <a:ext uri="{FF2B5EF4-FFF2-40B4-BE49-F238E27FC236}">
-                <a16:creationId xmlns:a16="http://schemas.microsoft.com/office/drawing/2014/main" id="{9D8BD1AA-3DF1-40EE-9254-D06FEB68956C}"/>
+                <a16:creationId xmlns:a16="http://schemas.microsoft.com/office/drawing/2014/main" id="{52F3788D-3935-4071-9F6E-3F8536F194D1}"/>
               </a:ext>
             </a:extLst>
           </p:cNvPr>
@@ -6626,17 +7366,17 @@
                 <a:latin typeface="標楷體" panose="03000509000000000000" pitchFamily="65" charset="-120"/>
                 <a:ea typeface="標楷體" panose="03000509000000000000" pitchFamily="65" charset="-120"/>
               </a:rPr>
-              <a:t>使用技術</a:t>
-            </a:r>
-          </a:p>
-        </p:txBody>
-      </p:sp>
-      <p:sp>
-        <p:nvSpPr>
-          <p:cNvPr id="3" name="內容版面配置區 2">
+              <a:t>重點、特色圖表</a:t>
+            </a:r>
+          </a:p>
+        </p:txBody>
+      </p:sp>
+      <p:sp>
+        <p:nvSpPr>
+          <p:cNvPr id="3" name="文字版面配置區 2">
             <a:extLst>
               <a:ext uri="{FF2B5EF4-FFF2-40B4-BE49-F238E27FC236}">
-                <a16:creationId xmlns:a16="http://schemas.microsoft.com/office/drawing/2014/main" id="{DC77F753-E23F-483D-82B2-E718DBD00F8A}"/>
+                <a16:creationId xmlns:a16="http://schemas.microsoft.com/office/drawing/2014/main" id="{41418093-7B47-4E4A-900C-71714FD30A80}"/>
               </a:ext>
             </a:extLst>
           </p:cNvPr>
@@ -6644,157 +7384,76 @@
             <a:spLocks noGrp="1"/>
           </p:cNvSpPr>
           <p:nvPr>
-            <p:ph idx="1"/>
-          </p:nvPr>
-        </p:nvSpPr>
-        <p:spPr>
-          <a:xfrm>
-            <a:off x="1295401" y="2556932"/>
-            <a:ext cx="9601196" cy="3691468"/>
-          </a:xfrm>
-        </p:spPr>
+            <p:ph type="body" idx="1"/>
+          </p:nvPr>
+        </p:nvSpPr>
+        <p:spPr/>
         <p:txBody>
           <a:bodyPr/>
           <a:lstStyle/>
           <a:p>
+            <a:r>
+              <a:rPr lang="zh-TW" altLang="en-US" dirty="0">
+                <a:latin typeface="標楷體" panose="03000509000000000000" pitchFamily="65" charset="-120"/>
+                <a:ea typeface="標楷體" panose="03000509000000000000" pitchFamily="65" charset="-120"/>
+              </a:rPr>
+              <a:t>登入、主頁</a:t>
+            </a:r>
+            <a:r>
+              <a:rPr lang="en-US" altLang="zh-TW" dirty="0">
+                <a:latin typeface="標楷體" panose="03000509000000000000" pitchFamily="65" charset="-120"/>
+                <a:ea typeface="標楷體" panose="03000509000000000000" pitchFamily="65" charset="-120"/>
+              </a:rPr>
+              <a:t>(</a:t>
+            </a:r>
+            <a:r>
+              <a:rPr lang="zh-TW" altLang="en-US" dirty="0">
+                <a:latin typeface="標楷體" panose="03000509000000000000" pitchFamily="65" charset="-120"/>
+                <a:ea typeface="標楷體" panose="03000509000000000000" pitchFamily="65" charset="-120"/>
+              </a:rPr>
+              <a:t>與快速導覽</a:t>
+            </a:r>
+            <a:r>
+              <a:rPr lang="en-US" altLang="zh-TW" dirty="0">
+                <a:latin typeface="標楷體" panose="03000509000000000000" pitchFamily="65" charset="-120"/>
+                <a:ea typeface="標楷體" panose="03000509000000000000" pitchFamily="65" charset="-120"/>
+              </a:rPr>
+              <a:t>)</a:t>
+            </a:r>
+            <a:r>
+              <a:rPr lang="zh-TW" altLang="en-US" dirty="0">
+                <a:latin typeface="標楷體" panose="03000509000000000000" pitchFamily="65" charset="-120"/>
+                <a:ea typeface="標楷體" panose="03000509000000000000" pitchFamily="65" charset="-120"/>
+              </a:rPr>
+              <a:t>、</a:t>
+            </a:r>
             <a:r>
               <a:rPr lang="en-US" altLang="zh-TW" dirty="0">
                 <a:latin typeface="Times New Roman" panose="02020603050405020304" pitchFamily="18" charset="0"/>
+                <a:ea typeface="標楷體" panose="03000509000000000000" pitchFamily="65" charset="-120"/>
                 <a:cs typeface="Times New Roman" panose="02020603050405020304" pitchFamily="18" charset="0"/>
               </a:rPr>
-              <a:t>HTML</a:t>
-            </a:r>
-          </a:p>
-          <a:p>
+              <a:t>Google</a:t>
+            </a:r>
+            <a:r>
+              <a:rPr lang="zh-TW" altLang="en-US" dirty="0">
+                <a:latin typeface="Times New Roman" panose="02020603050405020304" pitchFamily="18" charset="0"/>
+                <a:ea typeface="標楷體" panose="03000509000000000000" pitchFamily="65" charset="-120"/>
+                <a:cs typeface="Times New Roman" panose="02020603050405020304" pitchFamily="18" charset="0"/>
+              </a:rPr>
+              <a:t> </a:t>
+            </a:r>
             <a:r>
               <a:rPr lang="en-US" altLang="zh-TW" dirty="0">
                 <a:latin typeface="Times New Roman" panose="02020603050405020304" pitchFamily="18" charset="0"/>
+                <a:ea typeface="標楷體" panose="03000509000000000000" pitchFamily="65" charset="-120"/>
                 <a:cs typeface="Times New Roman" panose="02020603050405020304" pitchFamily="18" charset="0"/>
               </a:rPr>
-              <a:t>CSS</a:t>
-            </a:r>
-            <a:r>
-              <a:rPr lang="zh-TW" altLang="en-US" dirty="0">
-                <a:latin typeface="Times New Roman" panose="02020603050405020304" pitchFamily="18" charset="0"/>
-                <a:cs typeface="Times New Roman" panose="02020603050405020304" pitchFamily="18" charset="0"/>
-              </a:rPr>
-              <a:t>、</a:t>
-            </a:r>
-            <a:r>
-              <a:rPr lang="en-US" altLang="zh-TW" dirty="0">
-                <a:latin typeface="Times New Roman" panose="02020603050405020304" pitchFamily="18" charset="0"/>
-                <a:cs typeface="Times New Roman" panose="02020603050405020304" pitchFamily="18" charset="0"/>
-              </a:rPr>
-              <a:t>RWD</a:t>
-            </a:r>
-          </a:p>
-          <a:p>
-            <a:r>
-              <a:rPr lang="en-US" altLang="zh-TW" dirty="0">
-                <a:latin typeface="Times New Roman" panose="02020603050405020304" pitchFamily="18" charset="0"/>
-                <a:cs typeface="Times New Roman" panose="02020603050405020304" pitchFamily="18" charset="0"/>
-              </a:rPr>
-              <a:t>JavaScript</a:t>
-            </a:r>
-          </a:p>
-          <a:p>
-            <a:r>
-              <a:rPr lang="en-US" altLang="zh-TW" dirty="0">
-                <a:latin typeface="Times New Roman" panose="02020603050405020304" pitchFamily="18" charset="0"/>
-                <a:cs typeface="Times New Roman" panose="02020603050405020304" pitchFamily="18" charset="0"/>
-              </a:rPr>
-              <a:t>Google Sheet</a:t>
-            </a:r>
-            <a:r>
-              <a:rPr lang="zh-TW" altLang="en-US" dirty="0">
-                <a:latin typeface="Times New Roman" panose="02020603050405020304" pitchFamily="18" charset="0"/>
-                <a:cs typeface="Times New Roman" panose="02020603050405020304" pitchFamily="18" charset="0"/>
-              </a:rPr>
-              <a:t>、</a:t>
-            </a:r>
-            <a:r>
-              <a:rPr lang="en-US" altLang="zh-TW" dirty="0">
-                <a:latin typeface="Times New Roman" panose="02020603050405020304" pitchFamily="18" charset="0"/>
-                <a:cs typeface="Times New Roman" panose="02020603050405020304" pitchFamily="18" charset="0"/>
-              </a:rPr>
-              <a:t>Google Chart(ex</a:t>
-            </a:r>
-            <a:r>
-              <a:rPr lang="en-US" altLang="zh-TW" dirty="0"/>
-              <a:t>.</a:t>
-            </a:r>
-            <a:r>
-              <a:rPr lang="zh-TW" altLang="en-US" dirty="0"/>
-              <a:t> </a:t>
-            </a:r>
-            <a:r>
-              <a:rPr lang="zh-TW" altLang="en-US" dirty="0">
-                <a:latin typeface="標楷體" panose="03000509000000000000" pitchFamily="65" charset="-120"/>
-                <a:ea typeface="標楷體" panose="03000509000000000000" pitchFamily="65" charset="-120"/>
-              </a:rPr>
-              <a:t>熱量紀錄圓餅圖</a:t>
-            </a:r>
-            <a:r>
-              <a:rPr lang="en-US" altLang="zh-TW" dirty="0">
-                <a:latin typeface="標楷體" panose="03000509000000000000" pitchFamily="65" charset="-120"/>
-                <a:ea typeface="標楷體" panose="03000509000000000000" pitchFamily="65" charset="-120"/>
-              </a:rPr>
-              <a:t>)</a:t>
-            </a:r>
-          </a:p>
-          <a:p>
-            <a:r>
-              <a:rPr lang="en-US" altLang="zh-TW" dirty="0" err="1">
-                <a:latin typeface="Times New Roman" panose="02020603050405020304" pitchFamily="18" charset="0"/>
-                <a:cs typeface="Times New Roman" panose="02020603050405020304" pitchFamily="18" charset="0"/>
-              </a:rPr>
-              <a:t>FaceBook</a:t>
-            </a:r>
-            <a:r>
-              <a:rPr lang="en-US" altLang="zh-TW" dirty="0">
-                <a:latin typeface="Times New Roman" panose="02020603050405020304" pitchFamily="18" charset="0"/>
-                <a:cs typeface="Times New Roman" panose="02020603050405020304" pitchFamily="18" charset="0"/>
-              </a:rPr>
-              <a:t>(ex</a:t>
-            </a:r>
-            <a:r>
-              <a:rPr lang="en-US" altLang="zh-TW" dirty="0"/>
-              <a:t>. </a:t>
-            </a:r>
-            <a:r>
-              <a:rPr lang="zh-TW" altLang="en-US" dirty="0">
-                <a:latin typeface="標楷體" panose="03000509000000000000" pitchFamily="65" charset="-120"/>
-                <a:ea typeface="標楷體" panose="03000509000000000000" pitchFamily="65" charset="-120"/>
-              </a:rPr>
-              <a:t>推薦的健身、減重社團</a:t>
-            </a:r>
-            <a:r>
-              <a:rPr lang="en-US" altLang="zh-TW" dirty="0">
-                <a:latin typeface="標楷體" panose="03000509000000000000" pitchFamily="65" charset="-120"/>
-                <a:ea typeface="標楷體" panose="03000509000000000000" pitchFamily="65" charset="-120"/>
-              </a:rPr>
-              <a:t>)</a:t>
-            </a:r>
-          </a:p>
-          <a:p>
-            <a:r>
-              <a:rPr lang="en-US" altLang="zh-TW" dirty="0" err="1">
-                <a:latin typeface="Times New Roman" panose="02020603050405020304" pitchFamily="18" charset="0"/>
-                <a:ea typeface="標楷體" panose="03000509000000000000" pitchFamily="65" charset="-120"/>
-                <a:cs typeface="Times New Roman" panose="02020603050405020304" pitchFamily="18" charset="0"/>
-              </a:rPr>
-              <a:t>Instergram</a:t>
-            </a:r>
-            <a:r>
-              <a:rPr lang="en-US" altLang="zh-TW" dirty="0">
-                <a:latin typeface="Times New Roman" panose="02020603050405020304" pitchFamily="18" charset="0"/>
-                <a:ea typeface="標楷體" panose="03000509000000000000" pitchFamily="65" charset="-120"/>
-                <a:cs typeface="Times New Roman" panose="02020603050405020304" pitchFamily="18" charset="0"/>
-              </a:rPr>
-              <a:t>(#hashtag)</a:t>
+              <a:t>Chart</a:t>
             </a:r>
             <a:endParaRPr lang="zh-TW" altLang="en-US" dirty="0">
               <a:latin typeface="Times New Roman" panose="02020603050405020304" pitchFamily="18" charset="0"/>
+              <a:ea typeface="標楷體" panose="03000509000000000000" pitchFamily="65" charset="-120"/>
               <a:cs typeface="Times New Roman" panose="02020603050405020304" pitchFamily="18" charset="0"/>
             </a:endParaRPr>
           </a:p>
@@ -6803,7 +7462,7 @@
     </p:spTree>
     <p:extLst>
       <p:ext uri="{BB962C8B-B14F-4D97-AF65-F5344CB8AC3E}">
-        <p14:creationId xmlns:p14="http://schemas.microsoft.com/office/powerpoint/2010/main" val="495122803"/>
+        <p14:creationId xmlns:p14="http://schemas.microsoft.com/office/powerpoint/2010/main" val="381234423"/>
       </p:ext>
     </p:extLst>
   </p:cSld>
@@ -6835,7 +7494,7 @@
           <p:cNvPr id="2" name="標題 1">
             <a:extLst>
               <a:ext uri="{FF2B5EF4-FFF2-40B4-BE49-F238E27FC236}">
-                <a16:creationId xmlns:a16="http://schemas.microsoft.com/office/drawing/2014/main" id="{BF366DC7-F8D9-452D-8F7F-FC1E2F2E3F94}"/>
+                <a16:creationId xmlns:a16="http://schemas.microsoft.com/office/drawing/2014/main" id="{9FDD036D-D70D-4BA7-AEC3-E0AB35E8C3DD}"/>
               </a:ext>
             </a:extLst>
           </p:cNvPr>
@@ -6856,166 +7515,44 @@
                 <a:latin typeface="標楷體" panose="03000509000000000000" pitchFamily="65" charset="-120"/>
                 <a:ea typeface="標楷體" panose="03000509000000000000" pitchFamily="65" charset="-120"/>
               </a:rPr>
-              <a:t>分工</a:t>
-            </a:r>
-          </a:p>
-        </p:txBody>
-      </p:sp>
-      <p:sp>
-        <p:nvSpPr>
-          <p:cNvPr id="3" name="內容版面配置區 2">
+              <a:t>登入或註冊</a:t>
+            </a:r>
+          </a:p>
+        </p:txBody>
+      </p:sp>
+      <p:pic>
+        <p:nvPicPr>
+          <p:cNvPr id="7" name="內容版面配置區 6">
             <a:extLst>
               <a:ext uri="{FF2B5EF4-FFF2-40B4-BE49-F238E27FC236}">
-                <a16:creationId xmlns:a16="http://schemas.microsoft.com/office/drawing/2014/main" id="{802C3C8A-F8C1-4E2D-86E5-BF3F8F3FAE2A}"/>
+                <a16:creationId xmlns:a16="http://schemas.microsoft.com/office/drawing/2014/main" id="{BE74FE3F-05EB-4796-9DCF-79562832F901}"/>
               </a:ext>
             </a:extLst>
           </p:cNvPr>
-          <p:cNvSpPr>
-            <a:spLocks noGrp="1"/>
-          </p:cNvSpPr>
+          <p:cNvPicPr>
+            <a:picLocks noGrp="1" noChangeAspect="1"/>
+          </p:cNvPicPr>
           <p:nvPr>
             <p:ph idx="1"/>
           </p:nvPr>
-        </p:nvSpPr>
-        <p:spPr/>
-        <p:txBody>
-          <a:bodyPr/>
-          <a:lstStyle/>
-          <a:p>
-            <a:r>
-              <a:rPr lang="zh-TW" altLang="en-US" dirty="0">
-                <a:latin typeface="標楷體" panose="03000509000000000000" pitchFamily="65" charset="-120"/>
-                <a:ea typeface="標楷體" panose="03000509000000000000" pitchFamily="65" charset="-120"/>
-              </a:rPr>
-              <a:t>許皓翔：</a:t>
-            </a:r>
-            <a:r>
-              <a:rPr lang="en-US" altLang="zh-TW" dirty="0">
-                <a:latin typeface="Times New Roman" panose="02020603050405020304" pitchFamily="18" charset="0"/>
-                <a:cs typeface="Times New Roman" panose="02020603050405020304" pitchFamily="18" charset="0"/>
-              </a:rPr>
-              <a:t> </a:t>
-            </a:r>
-            <a:r>
-              <a:rPr lang="zh-TW" altLang="en-US" dirty="0">
-                <a:latin typeface="標楷體" panose="03000509000000000000" pitchFamily="65" charset="-120"/>
-                <a:ea typeface="標楷體" panose="03000509000000000000" pitchFamily="65" charset="-120"/>
-                <a:cs typeface="Times New Roman" panose="02020603050405020304" pitchFamily="18" charset="0"/>
-              </a:rPr>
-              <a:t>登入與主要功能</a:t>
-            </a:r>
-            <a:r>
-              <a:rPr lang="en-US" altLang="zh-TW" dirty="0">
-                <a:latin typeface="Times New Roman" panose="02020603050405020304" pitchFamily="18" charset="0"/>
-                <a:cs typeface="Times New Roman" panose="02020603050405020304" pitchFamily="18" charset="0"/>
-              </a:rPr>
-              <a:t>Google Sheet</a:t>
-            </a:r>
-            <a:r>
-              <a:rPr lang="zh-TW" altLang="en-US" dirty="0">
-                <a:latin typeface="Times New Roman" panose="02020603050405020304" pitchFamily="18" charset="0"/>
-                <a:cs typeface="Times New Roman" panose="02020603050405020304" pitchFamily="18" charset="0"/>
-              </a:rPr>
-              <a:t>、</a:t>
-            </a:r>
-            <a:r>
-              <a:rPr lang="en-US" altLang="zh-TW" dirty="0">
-                <a:latin typeface="Times New Roman" panose="02020603050405020304" pitchFamily="18" charset="0"/>
-                <a:cs typeface="Times New Roman" panose="02020603050405020304" pitchFamily="18" charset="0"/>
-              </a:rPr>
-              <a:t>Google Chart</a:t>
-            </a:r>
-            <a:r>
-              <a:rPr lang="zh-TW" altLang="en-US" dirty="0">
-                <a:latin typeface="Times New Roman" panose="02020603050405020304" pitchFamily="18" charset="0"/>
-                <a:cs typeface="Times New Roman" panose="02020603050405020304" pitchFamily="18" charset="0"/>
-              </a:rPr>
-              <a:t>  </a:t>
-            </a:r>
-            <a:r>
-              <a:rPr lang="en-US" altLang="zh-TW" dirty="0">
-                <a:latin typeface="Times New Roman" panose="02020603050405020304" pitchFamily="18" charset="0"/>
-                <a:cs typeface="Times New Roman" panose="02020603050405020304" pitchFamily="18" charset="0"/>
-              </a:rPr>
-              <a:t>CRUD</a:t>
-            </a:r>
-            <a:r>
-              <a:rPr lang="zh-TW" altLang="en-US" dirty="0">
-                <a:latin typeface="標楷體" panose="03000509000000000000" pitchFamily="65" charset="-120"/>
-                <a:ea typeface="標楷體" panose="03000509000000000000" pitchFamily="65" charset="-120"/>
-                <a:cs typeface="Times New Roman" panose="02020603050405020304" pitchFamily="18" charset="0"/>
-              </a:rPr>
-              <a:t>與其中的資料格式前處理</a:t>
-            </a:r>
-            <a:r>
-              <a:rPr lang="zh-TW" altLang="en-US" dirty="0">
-                <a:latin typeface="Times New Roman" panose="02020603050405020304" pitchFamily="18" charset="0"/>
-                <a:cs typeface="Times New Roman" panose="02020603050405020304" pitchFamily="18" charset="0"/>
-              </a:rPr>
-              <a:t>、</a:t>
-            </a:r>
-            <a:r>
-              <a:rPr lang="zh-TW" altLang="en-US" dirty="0">
-                <a:latin typeface="標楷體" panose="03000509000000000000" pitchFamily="65" charset="-120"/>
-                <a:ea typeface="標楷體" panose="03000509000000000000" pitchFamily="65" charset="-120"/>
-                <a:cs typeface="Times New Roman" panose="02020603050405020304" pitchFamily="18" charset="0"/>
-              </a:rPr>
-              <a:t>前端網站架構設計實作與測試。</a:t>
-            </a:r>
-            <a:endParaRPr lang="en-US" altLang="zh-TW" dirty="0">
-              <a:latin typeface="標楷體" panose="03000509000000000000" pitchFamily="65" charset="-120"/>
-              <a:ea typeface="標楷體" panose="03000509000000000000" pitchFamily="65" charset="-120"/>
-              <a:cs typeface="Times New Roman" panose="02020603050405020304" pitchFamily="18" charset="0"/>
-            </a:endParaRPr>
-          </a:p>
-          <a:p>
-            <a:r>
-              <a:rPr lang="zh-TW" altLang="en-US" dirty="0">
-                <a:latin typeface="標楷體" panose="03000509000000000000" pitchFamily="65" charset="-120"/>
-                <a:ea typeface="標楷體" panose="03000509000000000000" pitchFamily="65" charset="-120"/>
-                <a:cs typeface="Times New Roman" panose="02020603050405020304" pitchFamily="18" charset="0"/>
-              </a:rPr>
-              <a:t>黃祖麟：前端網站架構設計與測試、</a:t>
-            </a:r>
-            <a:r>
-              <a:rPr lang="en-US" altLang="zh-TW" dirty="0">
-                <a:latin typeface="Times New Roman" panose="02020603050405020304" pitchFamily="18" charset="0"/>
-                <a:ea typeface="標楷體" panose="03000509000000000000" pitchFamily="65" charset="-120"/>
-                <a:cs typeface="Times New Roman" panose="02020603050405020304" pitchFamily="18" charset="0"/>
-              </a:rPr>
-              <a:t>FB</a:t>
-            </a:r>
-            <a:r>
-              <a:rPr lang="zh-TW" altLang="en-US" dirty="0">
-                <a:latin typeface="Times New Roman" panose="02020603050405020304" pitchFamily="18" charset="0"/>
-                <a:ea typeface="標楷體" panose="03000509000000000000" pitchFamily="65" charset="-120"/>
-                <a:cs typeface="Times New Roman" panose="02020603050405020304" pitchFamily="18" charset="0"/>
-              </a:rPr>
-              <a:t>、</a:t>
-            </a:r>
-            <a:r>
-              <a:rPr lang="en-US" altLang="zh-TW" dirty="0">
-                <a:latin typeface="Times New Roman" panose="02020603050405020304" pitchFamily="18" charset="0"/>
-                <a:ea typeface="標楷體" panose="03000509000000000000" pitchFamily="65" charset="-120"/>
-                <a:cs typeface="Times New Roman" panose="02020603050405020304" pitchFamily="18" charset="0"/>
-              </a:rPr>
-              <a:t>IG</a:t>
-            </a:r>
-            <a:r>
-              <a:rPr lang="zh-TW" altLang="en-US" dirty="0">
-                <a:latin typeface="Times New Roman" panose="02020603050405020304" pitchFamily="18" charset="0"/>
-                <a:ea typeface="標楷體" panose="03000509000000000000" pitchFamily="65" charset="-120"/>
-                <a:cs typeface="Times New Roman" panose="02020603050405020304" pitchFamily="18" charset="0"/>
-              </a:rPr>
-              <a:t>、連接外部網站</a:t>
-            </a:r>
-          </a:p>
-        </p:txBody>
-      </p:sp>
+        </p:nvPicPr>
+        <p:blipFill>
+          <a:blip r:embed="rId2"/>
+          <a:stretch>
+            <a:fillRect/>
+          </a:stretch>
+        </p:blipFill>
+        <p:spPr>
+          <a:xfrm>
+            <a:off x="3185079" y="2557463"/>
+            <a:ext cx="5821841" cy="3317875"/>
+          </a:xfrm>
+        </p:spPr>
+      </p:pic>
     </p:spTree>
     <p:extLst>
       <p:ext uri="{BB962C8B-B14F-4D97-AF65-F5344CB8AC3E}">
-        <p14:creationId xmlns:p14="http://schemas.microsoft.com/office/powerpoint/2010/main" val="958456341"/>
+        <p14:creationId xmlns:p14="http://schemas.microsoft.com/office/powerpoint/2010/main" val="3278684019"/>
       </p:ext>
     </p:extLst>
   </p:cSld>
@@ -7047,7 +7584,7 @@
           <p:cNvPr id="2" name="標題 1">
             <a:extLst>
               <a:ext uri="{FF2B5EF4-FFF2-40B4-BE49-F238E27FC236}">
-                <a16:creationId xmlns:a16="http://schemas.microsoft.com/office/drawing/2014/main" id="{5D5E097E-37B6-4F2E-8A6A-D065C9BAE67E}"/>
+                <a16:creationId xmlns:a16="http://schemas.microsoft.com/office/drawing/2014/main" id="{9FDD036D-D70D-4BA7-AEC3-E0AB35E8C3DD}"/>
               </a:ext>
             </a:extLst>
           </p:cNvPr>
@@ -7064,29 +7601,102 @@
           <a:lstStyle/>
           <a:p>
             <a:r>
+              <a:rPr lang="zh-TW" altLang="en-US" dirty="0">
+                <a:latin typeface="標楷體" panose="03000509000000000000" pitchFamily="65" charset="-120"/>
+                <a:ea typeface="標楷體" panose="03000509000000000000" pitchFamily="65" charset="-120"/>
+              </a:rPr>
+              <a:t>主要頁面</a:t>
+            </a:r>
+          </a:p>
+        </p:txBody>
+      </p:sp>
+      <p:pic>
+        <p:nvPicPr>
+          <p:cNvPr id="7" name="內容版面配置區 6">
+            <a:extLst>
+              <a:ext uri="{FF2B5EF4-FFF2-40B4-BE49-F238E27FC236}">
+                <a16:creationId xmlns:a16="http://schemas.microsoft.com/office/drawing/2014/main" id="{BE74FE3F-05EB-4796-9DCF-79562832F901}"/>
+              </a:ext>
+            </a:extLst>
+          </p:cNvPr>
+          <p:cNvPicPr>
+            <a:picLocks noGrp="1" noChangeAspect="1"/>
+          </p:cNvPicPr>
+          <p:nvPr>
+            <p:ph idx="1"/>
+          </p:nvPr>
+        </p:nvPicPr>
+        <p:blipFill>
+          <a:blip r:embed="rId2">
+            <a:extLst>
+              <a:ext uri="{28A0092B-C50C-407E-A947-70E740481C1C}">
+                <a14:useLocalDpi xmlns:a14="http://schemas.microsoft.com/office/drawing/2010/main" val="0"/>
+              </a:ext>
+            </a:extLst>
+          </a:blip>
+          <a:srcRect/>
+          <a:stretch/>
+        </p:blipFill>
+        <p:spPr>
+          <a:xfrm>
+            <a:off x="3185079" y="2837786"/>
+            <a:ext cx="5821841" cy="2757228"/>
+          </a:xfrm>
+        </p:spPr>
+      </p:pic>
+      <p:sp>
+        <p:nvSpPr>
+          <p:cNvPr id="4" name="文字方塊 3">
+            <a:extLst>
+              <a:ext uri="{FF2B5EF4-FFF2-40B4-BE49-F238E27FC236}">
+                <a16:creationId xmlns:a16="http://schemas.microsoft.com/office/drawing/2014/main" id="{B248984B-C056-442B-9D08-E19BE0256DEF}"/>
+              </a:ext>
+            </a:extLst>
+          </p:cNvPr>
+          <p:cNvSpPr txBox="1"/>
+          <p:nvPr/>
+        </p:nvSpPr>
+        <p:spPr>
+          <a:xfrm>
+            <a:off x="3726023" y="5777469"/>
+            <a:ext cx="4739951" cy="369332"/>
+          </a:xfrm>
+          <a:prstGeom prst="rect">
+            <a:avLst/>
+          </a:prstGeom>
+          <a:noFill/>
+        </p:spPr>
+        <p:txBody>
+          <a:bodyPr wrap="square" rtlCol="0">
+            <a:spAutoFit/>
+          </a:bodyPr>
+          <a:lstStyle/>
+          <a:p>
+            <a:pPr algn="ctr"/>
+            <a:r>
               <a:rPr lang="en-US" altLang="zh-TW" dirty="0">
-                <a:latin typeface="Times New Roman" panose="02020603050405020304" pitchFamily="18" charset="0"/>
-                <a:cs typeface="Times New Roman" panose="02020603050405020304" pitchFamily="18" charset="0"/>
-              </a:rPr>
-              <a:t>THE</a:t>
+                <a:latin typeface="標楷體" panose="03000509000000000000" pitchFamily="65" charset="-120"/>
+                <a:ea typeface="標楷體" panose="03000509000000000000" pitchFamily="65" charset="-120"/>
+              </a:rPr>
+              <a:t>(</a:t>
             </a:r>
             <a:r>
               <a:rPr lang="zh-TW" altLang="en-US" dirty="0">
-                <a:latin typeface="Times New Roman" panose="02020603050405020304" pitchFamily="18" charset="0"/>
-                <a:cs typeface="Times New Roman" panose="02020603050405020304" pitchFamily="18" charset="0"/>
-              </a:rPr>
-              <a:t> </a:t>
+                <a:latin typeface="標楷體" panose="03000509000000000000" pitchFamily="65" charset="-120"/>
+                <a:ea typeface="標楷體" panose="03000509000000000000" pitchFamily="65" charset="-120"/>
+              </a:rPr>
+              <a:t>部分截圖，快速導覽於圖中左上下拉選單</a:t>
             </a:r>
             <a:r>
               <a:rPr lang="en-US" altLang="zh-TW" dirty="0">
-                <a:latin typeface="Times New Roman" panose="02020603050405020304" pitchFamily="18" charset="0"/>
-                <a:cs typeface="Times New Roman" panose="02020603050405020304" pitchFamily="18" charset="0"/>
-              </a:rPr>
-              <a:t>END</a:t>
+                <a:latin typeface="標楷體" panose="03000509000000000000" pitchFamily="65" charset="-120"/>
+                <a:ea typeface="標楷體" panose="03000509000000000000" pitchFamily="65" charset="-120"/>
+              </a:rPr>
+              <a:t>)</a:t>
             </a:r>
             <a:endParaRPr lang="zh-TW" altLang="en-US" dirty="0">
-              <a:latin typeface="Times New Roman" panose="02020603050405020304" pitchFamily="18" charset="0"/>
-              <a:cs typeface="Times New Roman" panose="02020603050405020304" pitchFamily="18" charset="0"/>
+              <a:latin typeface="標楷體" panose="03000509000000000000" pitchFamily="65" charset="-120"/>
+              <a:ea typeface="標楷體" panose="03000509000000000000" pitchFamily="65" charset="-120"/>
             </a:endParaRPr>
           </a:p>
         </p:txBody>
@@ -7094,7 +7704,533 @@
     </p:spTree>
     <p:extLst>
       <p:ext uri="{BB962C8B-B14F-4D97-AF65-F5344CB8AC3E}">
-        <p14:creationId xmlns:p14="http://schemas.microsoft.com/office/powerpoint/2010/main" val="983516014"/>
+        <p14:creationId xmlns:p14="http://schemas.microsoft.com/office/powerpoint/2010/main" val="3834162807"/>
+      </p:ext>
+    </p:extLst>
+  </p:cSld>
+  <p:clrMapOvr>
+    <a:masterClrMapping/>
+  </p:clrMapOvr>
+</p:sld>
+</file>
+
+<file path=ppt/slides/slide7.xml><?xml version="1.0" encoding="utf-8"?>
+<p:sld xmlns:a="http://schemas.openxmlformats.org/drawingml/2006/main" xmlns:r="http://schemas.openxmlformats.org/officeDocument/2006/relationships" xmlns:p="http://schemas.openxmlformats.org/presentationml/2006/main">
+  <p:cSld>
+    <p:spTree>
+      <p:nvGrpSpPr>
+        <p:cNvPr id="1" name=""/>
+        <p:cNvGrpSpPr/>
+        <p:nvPr/>
+      </p:nvGrpSpPr>
+      <p:grpSpPr>
+        <a:xfrm>
+          <a:off x="0" y="0"/>
+          <a:ext cx="0" cy="0"/>
+          <a:chOff x="0" y="0"/>
+          <a:chExt cx="0" cy="0"/>
+        </a:xfrm>
+      </p:grpSpPr>
+      <p:sp>
+        <p:nvSpPr>
+          <p:cNvPr id="2" name="標題 1">
+            <a:extLst>
+              <a:ext uri="{FF2B5EF4-FFF2-40B4-BE49-F238E27FC236}">
+                <a16:creationId xmlns:a16="http://schemas.microsoft.com/office/drawing/2014/main" id="{6285DE82-376C-4418-AB2A-778173696127}"/>
+              </a:ext>
+            </a:extLst>
+          </p:cNvPr>
+          <p:cNvSpPr>
+            <a:spLocks noGrp="1"/>
+          </p:cNvSpPr>
+          <p:nvPr>
+            <p:ph type="title"/>
+          </p:nvPr>
+        </p:nvSpPr>
+        <p:spPr/>
+        <p:txBody>
+          <a:bodyPr/>
+          <a:lstStyle/>
+          <a:p>
+            <a:r>
+              <a:rPr lang="zh-TW" altLang="en-US" dirty="0">
+                <a:latin typeface="標楷體" panose="03000509000000000000" pitchFamily="65" charset="-120"/>
+                <a:ea typeface="標楷體" panose="03000509000000000000" pitchFamily="65" charset="-120"/>
+              </a:rPr>
+              <a:t>熱量紀錄</a:t>
+            </a:r>
+            <a:r>
+              <a:rPr lang="en-US" altLang="zh-TW" dirty="0">
+                <a:latin typeface="標楷體" panose="03000509000000000000" pitchFamily="65" charset="-120"/>
+                <a:ea typeface="標楷體" panose="03000509000000000000" pitchFamily="65" charset="-120"/>
+              </a:rPr>
+              <a:t>(</a:t>
+            </a:r>
+            <a:r>
+              <a:rPr lang="zh-TW" altLang="en-US" dirty="0">
+                <a:latin typeface="標楷體" panose="03000509000000000000" pitchFamily="65" charset="-120"/>
+                <a:ea typeface="標楷體" panose="03000509000000000000" pitchFamily="65" charset="-120"/>
+              </a:rPr>
+              <a:t>營養、卡路里圓餅圖</a:t>
+            </a:r>
+            <a:r>
+              <a:rPr lang="en-US" altLang="zh-TW" dirty="0">
+                <a:latin typeface="標楷體" panose="03000509000000000000" pitchFamily="65" charset="-120"/>
+                <a:ea typeface="標楷體" panose="03000509000000000000" pitchFamily="65" charset="-120"/>
+              </a:rPr>
+              <a:t>)</a:t>
+            </a:r>
+            <a:endParaRPr lang="zh-TW" altLang="en-US" dirty="0">
+              <a:latin typeface="標楷體" panose="03000509000000000000" pitchFamily="65" charset="-120"/>
+              <a:ea typeface="標楷體" panose="03000509000000000000" pitchFamily="65" charset="-120"/>
+            </a:endParaRPr>
+          </a:p>
+        </p:txBody>
+      </p:sp>
+      <p:pic>
+        <p:nvPicPr>
+          <p:cNvPr id="5" name="內容版面配置區 4">
+            <a:extLst>
+              <a:ext uri="{FF2B5EF4-FFF2-40B4-BE49-F238E27FC236}">
+                <a16:creationId xmlns:a16="http://schemas.microsoft.com/office/drawing/2014/main" id="{557B0DBF-AEB7-41C4-9F80-9AA8929E3BF5}"/>
+              </a:ext>
+            </a:extLst>
+          </p:cNvPr>
+          <p:cNvPicPr>
+            <a:picLocks noGrp="1" noChangeAspect="1"/>
+          </p:cNvPicPr>
+          <p:nvPr>
+            <p:ph idx="1"/>
+          </p:nvPr>
+        </p:nvPicPr>
+        <p:blipFill>
+          <a:blip r:embed="rId2"/>
+          <a:stretch>
+            <a:fillRect/>
+          </a:stretch>
+        </p:blipFill>
+        <p:spPr>
+          <a:xfrm>
+            <a:off x="2269741" y="2557993"/>
+            <a:ext cx="7652518" cy="3317875"/>
+          </a:xfrm>
+        </p:spPr>
+      </p:pic>
+      <p:sp>
+        <p:nvSpPr>
+          <p:cNvPr id="27" name="文字方塊 26">
+            <a:extLst>
+              <a:ext uri="{FF2B5EF4-FFF2-40B4-BE49-F238E27FC236}">
+                <a16:creationId xmlns:a16="http://schemas.microsoft.com/office/drawing/2014/main" id="{F837BE2D-365F-4779-BA98-7CC61916F6A4}"/>
+              </a:ext>
+            </a:extLst>
+          </p:cNvPr>
+          <p:cNvSpPr txBox="1"/>
+          <p:nvPr/>
+        </p:nvSpPr>
+        <p:spPr>
+          <a:xfrm>
+            <a:off x="3881535" y="5803641"/>
+            <a:ext cx="4572000" cy="369332"/>
+          </a:xfrm>
+          <a:prstGeom prst="rect">
+            <a:avLst/>
+          </a:prstGeom>
+          <a:noFill/>
+        </p:spPr>
+        <p:txBody>
+          <a:bodyPr wrap="square" rtlCol="0">
+            <a:spAutoFit/>
+          </a:bodyPr>
+          <a:lstStyle/>
+          <a:p>
+            <a:pPr algn="ctr"/>
+            <a:r>
+              <a:rPr lang="en-US" altLang="zh-TW" dirty="0">
+                <a:latin typeface="標楷體" panose="03000509000000000000" pitchFamily="65" charset="-120"/>
+                <a:ea typeface="標楷體" panose="03000509000000000000" pitchFamily="65" charset="-120"/>
+              </a:rPr>
+              <a:t>(</a:t>
+            </a:r>
+            <a:r>
+              <a:rPr lang="zh-TW" altLang="en-US" dirty="0">
+                <a:latin typeface="標楷體" panose="03000509000000000000" pitchFamily="65" charset="-120"/>
+                <a:ea typeface="標楷體" panose="03000509000000000000" pitchFamily="65" charset="-120"/>
+              </a:rPr>
+              <a:t>部分截圖</a:t>
+            </a:r>
+            <a:r>
+              <a:rPr lang="en-US" altLang="zh-TW" dirty="0">
+                <a:latin typeface="標楷體" panose="03000509000000000000" pitchFamily="65" charset="-120"/>
+                <a:ea typeface="標楷體" panose="03000509000000000000" pitchFamily="65" charset="-120"/>
+              </a:rPr>
+              <a:t>)</a:t>
+            </a:r>
+            <a:endParaRPr lang="zh-TW" altLang="en-US" dirty="0">
+              <a:latin typeface="標楷體" panose="03000509000000000000" pitchFamily="65" charset="-120"/>
+              <a:ea typeface="標楷體" panose="03000509000000000000" pitchFamily="65" charset="-120"/>
+            </a:endParaRPr>
+          </a:p>
+        </p:txBody>
+      </p:sp>
+    </p:spTree>
+    <p:extLst>
+      <p:ext uri="{BB962C8B-B14F-4D97-AF65-F5344CB8AC3E}">
+        <p14:creationId xmlns:p14="http://schemas.microsoft.com/office/powerpoint/2010/main" val="1375447447"/>
+      </p:ext>
+    </p:extLst>
+  </p:cSld>
+  <p:clrMapOvr>
+    <a:masterClrMapping/>
+  </p:clrMapOvr>
+</p:sld>
+</file>
+
+<file path=ppt/slides/slide8.xml><?xml version="1.0" encoding="utf-8"?>
+<p:sld xmlns:a="http://schemas.openxmlformats.org/drawingml/2006/main" xmlns:r="http://schemas.openxmlformats.org/officeDocument/2006/relationships" xmlns:p="http://schemas.openxmlformats.org/presentationml/2006/main">
+  <p:cSld>
+    <p:spTree>
+      <p:nvGrpSpPr>
+        <p:cNvPr id="1" name=""/>
+        <p:cNvGrpSpPr/>
+        <p:nvPr/>
+      </p:nvGrpSpPr>
+      <p:grpSpPr>
+        <a:xfrm>
+          <a:off x="0" y="0"/>
+          <a:ext cx="0" cy="0"/>
+          <a:chOff x="0" y="0"/>
+          <a:chExt cx="0" cy="0"/>
+        </a:xfrm>
+      </p:grpSpPr>
+      <p:sp>
+        <p:nvSpPr>
+          <p:cNvPr id="2" name="標題 1">
+            <a:extLst>
+              <a:ext uri="{FF2B5EF4-FFF2-40B4-BE49-F238E27FC236}">
+                <a16:creationId xmlns:a16="http://schemas.microsoft.com/office/drawing/2014/main" id="{6285DE82-376C-4418-AB2A-778173696127}"/>
+              </a:ext>
+            </a:extLst>
+          </p:cNvPr>
+          <p:cNvSpPr>
+            <a:spLocks noGrp="1"/>
+          </p:cNvSpPr>
+          <p:nvPr>
+            <p:ph type="title"/>
+          </p:nvPr>
+        </p:nvSpPr>
+        <p:spPr/>
+        <p:txBody>
+          <a:bodyPr/>
+          <a:lstStyle/>
+          <a:p>
+            <a:r>
+              <a:rPr lang="zh-TW" altLang="en-US" dirty="0">
+                <a:latin typeface="標楷體" panose="03000509000000000000" pitchFamily="65" charset="-120"/>
+                <a:ea typeface="標楷體" panose="03000509000000000000" pitchFamily="65" charset="-120"/>
+              </a:rPr>
+              <a:t>運動紀錄</a:t>
+            </a:r>
+            <a:r>
+              <a:rPr lang="en-US" altLang="zh-TW" dirty="0">
+                <a:latin typeface="標楷體" panose="03000509000000000000" pitchFamily="65" charset="-120"/>
+                <a:ea typeface="標楷體" panose="03000509000000000000" pitchFamily="65" charset="-120"/>
+              </a:rPr>
+              <a:t>(</a:t>
+            </a:r>
+            <a:r>
+              <a:rPr lang="zh-TW" altLang="en-US" dirty="0">
+                <a:latin typeface="標楷體" panose="03000509000000000000" pitchFamily="65" charset="-120"/>
+                <a:ea typeface="標楷體" panose="03000509000000000000" pitchFamily="65" charset="-120"/>
+              </a:rPr>
+              <a:t>項目時間圓餅圖</a:t>
+            </a:r>
+            <a:r>
+              <a:rPr lang="en-US" altLang="zh-TW" dirty="0">
+                <a:latin typeface="標楷體" panose="03000509000000000000" pitchFamily="65" charset="-120"/>
+                <a:ea typeface="標楷體" panose="03000509000000000000" pitchFamily="65" charset="-120"/>
+              </a:rPr>
+              <a:t>)</a:t>
+            </a:r>
+            <a:endParaRPr lang="zh-TW" altLang="en-US" dirty="0">
+              <a:latin typeface="標楷體" panose="03000509000000000000" pitchFamily="65" charset="-120"/>
+              <a:ea typeface="標楷體" panose="03000509000000000000" pitchFamily="65" charset="-120"/>
+            </a:endParaRPr>
+          </a:p>
+        </p:txBody>
+      </p:sp>
+      <p:pic>
+        <p:nvPicPr>
+          <p:cNvPr id="5" name="內容版面配置區 4">
+            <a:extLst>
+              <a:ext uri="{FF2B5EF4-FFF2-40B4-BE49-F238E27FC236}">
+                <a16:creationId xmlns:a16="http://schemas.microsoft.com/office/drawing/2014/main" id="{557B0DBF-AEB7-41C4-9F80-9AA8929E3BF5}"/>
+              </a:ext>
+            </a:extLst>
+          </p:cNvPr>
+          <p:cNvPicPr>
+            <a:picLocks noGrp="1" noChangeAspect="1"/>
+          </p:cNvPicPr>
+          <p:nvPr>
+            <p:ph idx="1"/>
+          </p:nvPr>
+        </p:nvPicPr>
+        <p:blipFill>
+          <a:blip r:embed="rId2">
+            <a:extLst>
+              <a:ext uri="{28A0092B-C50C-407E-A947-70E740481C1C}">
+                <a14:useLocalDpi xmlns:a14="http://schemas.microsoft.com/office/drawing/2010/main" val="0"/>
+              </a:ext>
+            </a:extLst>
+          </a:blip>
+          <a:srcRect/>
+          <a:stretch/>
+        </p:blipFill>
+        <p:spPr>
+          <a:xfrm>
+            <a:off x="3649123" y="2557993"/>
+            <a:ext cx="4893753" cy="3317875"/>
+          </a:xfrm>
+        </p:spPr>
+      </p:pic>
+      <p:sp>
+        <p:nvSpPr>
+          <p:cNvPr id="4" name="文字方塊 3">
+            <a:extLst>
+              <a:ext uri="{FF2B5EF4-FFF2-40B4-BE49-F238E27FC236}">
+                <a16:creationId xmlns:a16="http://schemas.microsoft.com/office/drawing/2014/main" id="{1B8E6827-478D-496E-8DFA-3DFFD371B90F}"/>
+              </a:ext>
+            </a:extLst>
+          </p:cNvPr>
+          <p:cNvSpPr txBox="1"/>
+          <p:nvPr/>
+        </p:nvSpPr>
+        <p:spPr>
+          <a:xfrm>
+            <a:off x="3881535" y="5803641"/>
+            <a:ext cx="4572000" cy="369332"/>
+          </a:xfrm>
+          <a:prstGeom prst="rect">
+            <a:avLst/>
+          </a:prstGeom>
+          <a:noFill/>
+        </p:spPr>
+        <p:txBody>
+          <a:bodyPr wrap="square" rtlCol="0">
+            <a:spAutoFit/>
+          </a:bodyPr>
+          <a:lstStyle/>
+          <a:p>
+            <a:pPr algn="ctr"/>
+            <a:r>
+              <a:rPr lang="en-US" altLang="zh-TW" dirty="0">
+                <a:latin typeface="標楷體" panose="03000509000000000000" pitchFamily="65" charset="-120"/>
+                <a:ea typeface="標楷體" panose="03000509000000000000" pitchFamily="65" charset="-120"/>
+              </a:rPr>
+              <a:t>(</a:t>
+            </a:r>
+            <a:r>
+              <a:rPr lang="zh-TW" altLang="en-US" dirty="0">
+                <a:latin typeface="標楷體" panose="03000509000000000000" pitchFamily="65" charset="-120"/>
+                <a:ea typeface="標楷體" panose="03000509000000000000" pitchFamily="65" charset="-120"/>
+              </a:rPr>
+              <a:t>部分截圖</a:t>
+            </a:r>
+            <a:r>
+              <a:rPr lang="en-US" altLang="zh-TW" dirty="0">
+                <a:latin typeface="標楷體" panose="03000509000000000000" pitchFamily="65" charset="-120"/>
+                <a:ea typeface="標楷體" panose="03000509000000000000" pitchFamily="65" charset="-120"/>
+              </a:rPr>
+              <a:t>)</a:t>
+            </a:r>
+            <a:endParaRPr lang="zh-TW" altLang="en-US" dirty="0">
+              <a:latin typeface="標楷體" panose="03000509000000000000" pitchFamily="65" charset="-120"/>
+              <a:ea typeface="標楷體" panose="03000509000000000000" pitchFamily="65" charset="-120"/>
+            </a:endParaRPr>
+          </a:p>
+        </p:txBody>
+      </p:sp>
+    </p:spTree>
+    <p:extLst>
+      <p:ext uri="{BB962C8B-B14F-4D97-AF65-F5344CB8AC3E}">
+        <p14:creationId xmlns:p14="http://schemas.microsoft.com/office/powerpoint/2010/main" val="2556771030"/>
+      </p:ext>
+    </p:extLst>
+  </p:cSld>
+  <p:clrMapOvr>
+    <a:masterClrMapping/>
+  </p:clrMapOvr>
+</p:sld>
+</file>
+
+<file path=ppt/slides/slide9.xml><?xml version="1.0" encoding="utf-8"?>
+<p:sld xmlns:a="http://schemas.openxmlformats.org/drawingml/2006/main" xmlns:r="http://schemas.openxmlformats.org/officeDocument/2006/relationships" xmlns:p="http://schemas.openxmlformats.org/presentationml/2006/main">
+  <p:cSld>
+    <p:spTree>
+      <p:nvGrpSpPr>
+        <p:cNvPr id="1" name=""/>
+        <p:cNvGrpSpPr/>
+        <p:nvPr/>
+      </p:nvGrpSpPr>
+      <p:grpSpPr>
+        <a:xfrm>
+          <a:off x="0" y="0"/>
+          <a:ext cx="0" cy="0"/>
+          <a:chOff x="0" y="0"/>
+          <a:chExt cx="0" cy="0"/>
+        </a:xfrm>
+      </p:grpSpPr>
+      <p:sp>
+        <p:nvSpPr>
+          <p:cNvPr id="2" name="標題 1">
+            <a:extLst>
+              <a:ext uri="{FF2B5EF4-FFF2-40B4-BE49-F238E27FC236}">
+                <a16:creationId xmlns:a16="http://schemas.microsoft.com/office/drawing/2014/main" id="{6285DE82-376C-4418-AB2A-778173696127}"/>
+              </a:ext>
+            </a:extLst>
+          </p:cNvPr>
+          <p:cNvSpPr>
+            <a:spLocks noGrp="1"/>
+          </p:cNvSpPr>
+          <p:nvPr>
+            <p:ph type="title"/>
+          </p:nvPr>
+        </p:nvSpPr>
+        <p:spPr/>
+        <p:txBody>
+          <a:bodyPr/>
+          <a:lstStyle/>
+          <a:p>
+            <a:r>
+              <a:rPr lang="zh-TW" altLang="en-US" dirty="0">
+                <a:latin typeface="標楷體" panose="03000509000000000000" pitchFamily="65" charset="-120"/>
+                <a:ea typeface="標楷體" panose="03000509000000000000" pitchFamily="65" charset="-120"/>
+              </a:rPr>
+              <a:t>體重紀錄</a:t>
+            </a:r>
+            <a:r>
+              <a:rPr lang="en-US" altLang="zh-TW" dirty="0">
+                <a:latin typeface="標楷體" panose="03000509000000000000" pitchFamily="65" charset="-120"/>
+                <a:ea typeface="標楷體" panose="03000509000000000000" pitchFamily="65" charset="-120"/>
+              </a:rPr>
+              <a:t>(</a:t>
+            </a:r>
+            <a:r>
+              <a:rPr lang="zh-TW" altLang="en-US" dirty="0">
+                <a:latin typeface="標楷體" panose="03000509000000000000" pitchFamily="65" charset="-120"/>
+                <a:ea typeface="標楷體" panose="03000509000000000000" pitchFamily="65" charset="-120"/>
+              </a:rPr>
+              <a:t>體重、身高、</a:t>
+            </a:r>
+            <a:r>
+              <a:rPr lang="en-US" altLang="zh-TW" dirty="0">
+                <a:latin typeface="標楷體" panose="03000509000000000000" pitchFamily="65" charset="-120"/>
+                <a:ea typeface="標楷體" panose="03000509000000000000" pitchFamily="65" charset="-120"/>
+              </a:rPr>
+              <a:t>BMI)</a:t>
+            </a:r>
+            <a:endParaRPr lang="zh-TW" altLang="en-US" dirty="0">
+              <a:latin typeface="標楷體" panose="03000509000000000000" pitchFamily="65" charset="-120"/>
+              <a:ea typeface="標楷體" panose="03000509000000000000" pitchFamily="65" charset="-120"/>
+            </a:endParaRPr>
+          </a:p>
+        </p:txBody>
+      </p:sp>
+      <p:pic>
+        <p:nvPicPr>
+          <p:cNvPr id="5" name="內容版面配置區 4">
+            <a:extLst>
+              <a:ext uri="{FF2B5EF4-FFF2-40B4-BE49-F238E27FC236}">
+                <a16:creationId xmlns:a16="http://schemas.microsoft.com/office/drawing/2014/main" id="{557B0DBF-AEB7-41C4-9F80-9AA8929E3BF5}"/>
+              </a:ext>
+            </a:extLst>
+          </p:cNvPr>
+          <p:cNvPicPr>
+            <a:picLocks noGrp="1" noChangeAspect="1"/>
+          </p:cNvPicPr>
+          <p:nvPr>
+            <p:ph idx="1"/>
+          </p:nvPr>
+        </p:nvPicPr>
+        <p:blipFill>
+          <a:blip r:embed="rId2">
+            <a:extLst>
+              <a:ext uri="{28A0092B-C50C-407E-A947-70E740481C1C}">
+                <a14:useLocalDpi xmlns:a14="http://schemas.microsoft.com/office/drawing/2010/main" val="0"/>
+              </a:ext>
+            </a:extLst>
+          </a:blip>
+          <a:srcRect/>
+          <a:stretch/>
+        </p:blipFill>
+        <p:spPr>
+          <a:xfrm>
+            <a:off x="3649123" y="2789741"/>
+            <a:ext cx="4893753" cy="2854379"/>
+          </a:xfrm>
+        </p:spPr>
+      </p:pic>
+      <p:sp>
+        <p:nvSpPr>
+          <p:cNvPr id="3" name="文字方塊 2">
+            <a:extLst>
+              <a:ext uri="{FF2B5EF4-FFF2-40B4-BE49-F238E27FC236}">
+                <a16:creationId xmlns:a16="http://schemas.microsoft.com/office/drawing/2014/main" id="{5FE66AA5-A0F0-4CA0-BDDD-2EEBFEE822A6}"/>
+              </a:ext>
+            </a:extLst>
+          </p:cNvPr>
+          <p:cNvSpPr txBox="1"/>
+          <p:nvPr/>
+        </p:nvSpPr>
+        <p:spPr>
+          <a:xfrm>
+            <a:off x="3881535" y="5803641"/>
+            <a:ext cx="4572000" cy="369332"/>
+          </a:xfrm>
+          <a:prstGeom prst="rect">
+            <a:avLst/>
+          </a:prstGeom>
+          <a:noFill/>
+        </p:spPr>
+        <p:txBody>
+          <a:bodyPr wrap="square" rtlCol="0">
+            <a:spAutoFit/>
+          </a:bodyPr>
+          <a:lstStyle/>
+          <a:p>
+            <a:pPr algn="ctr"/>
+            <a:r>
+              <a:rPr lang="en-US" altLang="zh-TW" dirty="0">
+                <a:latin typeface="標楷體" panose="03000509000000000000" pitchFamily="65" charset="-120"/>
+                <a:ea typeface="標楷體" panose="03000509000000000000" pitchFamily="65" charset="-120"/>
+              </a:rPr>
+              <a:t>(</a:t>
+            </a:r>
+            <a:r>
+              <a:rPr lang="zh-TW" altLang="en-US" dirty="0">
+                <a:latin typeface="標楷體" panose="03000509000000000000" pitchFamily="65" charset="-120"/>
+                <a:ea typeface="標楷體" panose="03000509000000000000" pitchFamily="65" charset="-120"/>
+              </a:rPr>
+              <a:t>部分截圖</a:t>
+            </a:r>
+            <a:r>
+              <a:rPr lang="en-US" altLang="zh-TW" dirty="0">
+                <a:latin typeface="標楷體" panose="03000509000000000000" pitchFamily="65" charset="-120"/>
+                <a:ea typeface="標楷體" panose="03000509000000000000" pitchFamily="65" charset="-120"/>
+              </a:rPr>
+              <a:t>)</a:t>
+            </a:r>
+            <a:endParaRPr lang="zh-TW" altLang="en-US" dirty="0">
+              <a:latin typeface="標楷體" panose="03000509000000000000" pitchFamily="65" charset="-120"/>
+              <a:ea typeface="標楷體" panose="03000509000000000000" pitchFamily="65" charset="-120"/>
+            </a:endParaRPr>
+          </a:p>
+        </p:txBody>
+      </p:sp>
+    </p:spTree>
+    <p:extLst>
+      <p:ext uri="{BB962C8B-B14F-4D97-AF65-F5344CB8AC3E}">
+        <p14:creationId xmlns:p14="http://schemas.microsoft.com/office/powerpoint/2010/main" val="2956889358"/>
       </p:ext>
     </p:extLst>
   </p:cSld>

</xml_diff>